<commit_message>
Jatai and veda lectures 30/10/2020
</commit_message>
<xml_diff>
--- a/Veda Lectures/Veda Basics.pptx
+++ b/Veda Lectures/Veda Basics.pptx
@@ -449,7 +449,7 @@
             <a:fld id="{B61BEF0D-F0BB-DE4B-95CE-6DB70DBA9567}" type="datetimeFigureOut">
               <a:rPr lang="en-US" dirty="0"/>
               <a:pPr/>
-              <a:t>8/20/2020</a:t>
+              <a:t>10/27/2020</a:t>
             </a:fld>
             <a:endParaRPr lang="en-US" dirty="0"/>
           </a:p>
@@ -882,7 +882,7 @@
             <a:fld id="{B61BEF0D-F0BB-DE4B-95CE-6DB70DBA9567}" type="datetimeFigureOut">
               <a:rPr lang="en-US" dirty="0"/>
               <a:pPr/>
-              <a:t>8/20/2020</a:t>
+              <a:t>10/27/2020</a:t>
             </a:fld>
             <a:endParaRPr lang="en-US" dirty="0"/>
           </a:p>
@@ -1129,7 +1129,7 @@
             <a:fld id="{B61BEF0D-F0BB-DE4B-95CE-6DB70DBA9567}" type="datetimeFigureOut">
               <a:rPr lang="en-US" dirty="0"/>
               <a:pPr/>
-              <a:t>8/20/2020</a:t>
+              <a:t>10/27/2020</a:t>
             </a:fld>
             <a:endParaRPr lang="en-US" dirty="0"/>
           </a:p>
@@ -1434,7 +1434,7 @@
             <a:fld id="{B61BEF0D-F0BB-DE4B-95CE-6DB70DBA9567}" type="datetimeFigureOut">
               <a:rPr lang="en-US" dirty="0"/>
               <a:pPr/>
-              <a:t>8/20/2020</a:t>
+              <a:t>10/27/2020</a:t>
             </a:fld>
             <a:endParaRPr lang="en-US" dirty="0"/>
           </a:p>
@@ -1749,7 +1749,7 @@
             <a:fld id="{B61BEF0D-F0BB-DE4B-95CE-6DB70DBA9567}" type="datetimeFigureOut">
               <a:rPr lang="en-US" dirty="0"/>
               <a:pPr/>
-              <a:t>8/20/2020</a:t>
+              <a:t>10/27/2020</a:t>
             </a:fld>
             <a:endParaRPr lang="en-US" dirty="0"/>
           </a:p>
@@ -2048,7 +2048,7 @@
             <a:fld id="{B61BEF0D-F0BB-DE4B-95CE-6DB70DBA9567}" type="datetimeFigureOut">
               <a:rPr lang="en-US" dirty="0"/>
               <a:pPr/>
-              <a:t>8/20/2020</a:t>
+              <a:t>10/27/2020</a:t>
             </a:fld>
             <a:endParaRPr lang="en-US" dirty="0"/>
           </a:p>
@@ -2412,7 +2412,7 @@
             <a:fld id="{B61BEF0D-F0BB-DE4B-95CE-6DB70DBA9567}" type="datetimeFigureOut">
               <a:rPr lang="en-US" dirty="0"/>
               <a:pPr/>
-              <a:t>8/20/2020</a:t>
+              <a:t>10/27/2020</a:t>
             </a:fld>
             <a:endParaRPr lang="en-US" dirty="0"/>
           </a:p>
@@ -2583,7 +2583,7 @@
             <a:fld id="{B61BEF0D-F0BB-DE4B-95CE-6DB70DBA9567}" type="datetimeFigureOut">
               <a:rPr lang="en-US" dirty="0"/>
               <a:pPr/>
-              <a:t>8/20/2020</a:t>
+              <a:t>10/27/2020</a:t>
             </a:fld>
             <a:endParaRPr lang="en-US" dirty="0"/>
           </a:p>
@@ -2760,7 +2760,7 @@
             <a:fld id="{B61BEF0D-F0BB-DE4B-95CE-6DB70DBA9567}" type="datetimeFigureOut">
               <a:rPr lang="en-US" dirty="0"/>
               <a:pPr/>
-              <a:t>8/20/2020</a:t>
+              <a:t>10/27/2020</a:t>
             </a:fld>
             <a:endParaRPr lang="en-US" dirty="0"/>
           </a:p>
@@ -2927,7 +2927,7 @@
             <a:fld id="{B61BEF0D-F0BB-DE4B-95CE-6DB70DBA9567}" type="datetimeFigureOut">
               <a:rPr lang="en-US" dirty="0"/>
               <a:pPr/>
-              <a:t>8/20/2020</a:t>
+              <a:t>10/27/2020</a:t>
             </a:fld>
             <a:endParaRPr lang="en-US" dirty="0"/>
           </a:p>
@@ -3174,7 +3174,7 @@
             <a:fld id="{B61BEF0D-F0BB-DE4B-95CE-6DB70DBA9567}" type="datetimeFigureOut">
               <a:rPr lang="en-US" dirty="0"/>
               <a:pPr/>
-              <a:t>8/20/2020</a:t>
+              <a:t>10/27/2020</a:t>
             </a:fld>
             <a:endParaRPr lang="en-US" dirty="0"/>
           </a:p>
@@ -3407,7 +3407,7 @@
             <a:fld id="{B61BEF0D-F0BB-DE4B-95CE-6DB70DBA9567}" type="datetimeFigureOut">
               <a:rPr lang="en-US" dirty="0"/>
               <a:pPr/>
-              <a:t>8/20/2020</a:t>
+              <a:t>10/27/2020</a:t>
             </a:fld>
             <a:endParaRPr lang="en-US" dirty="0"/>
           </a:p>
@@ -3786,7 +3786,7 @@
             <a:fld id="{B61BEF0D-F0BB-DE4B-95CE-6DB70DBA9567}" type="datetimeFigureOut">
               <a:rPr lang="en-US" dirty="0"/>
               <a:pPr/>
-              <a:t>8/20/2020</a:t>
+              <a:t>10/27/2020</a:t>
             </a:fld>
             <a:endParaRPr lang="en-US" dirty="0"/>
           </a:p>
@@ -3901,7 +3901,7 @@
             <a:fld id="{B61BEF0D-F0BB-DE4B-95CE-6DB70DBA9567}" type="datetimeFigureOut">
               <a:rPr lang="en-US" dirty="0"/>
               <a:pPr/>
-              <a:t>8/20/2020</a:t>
+              <a:t>10/27/2020</a:t>
             </a:fld>
             <a:endParaRPr lang="en-US" dirty="0"/>
           </a:p>
@@ -3993,7 +3993,7 @@
             <a:fld id="{B61BEF0D-F0BB-DE4B-95CE-6DB70DBA9567}" type="datetimeFigureOut">
               <a:rPr lang="en-US" dirty="0"/>
               <a:pPr/>
-              <a:t>8/20/2020</a:t>
+              <a:t>10/27/2020</a:t>
             </a:fld>
             <a:endParaRPr lang="en-US" dirty="0"/>
           </a:p>
@@ -4245,7 +4245,7 @@
             <a:fld id="{B61BEF0D-F0BB-DE4B-95CE-6DB70DBA9567}" type="datetimeFigureOut">
               <a:rPr lang="en-US" dirty="0"/>
               <a:pPr/>
-              <a:t>8/20/2020</a:t>
+              <a:t>10/27/2020</a:t>
             </a:fld>
             <a:endParaRPr lang="en-US" dirty="0"/>
           </a:p>
@@ -4525,7 +4525,7 @@
             <a:fld id="{B61BEF0D-F0BB-DE4B-95CE-6DB70DBA9567}" type="datetimeFigureOut">
               <a:rPr lang="en-US" dirty="0"/>
               <a:pPr/>
-              <a:t>8/20/2020</a:t>
+              <a:t>10/27/2020</a:t>
             </a:fld>
             <a:endParaRPr lang="en-US" dirty="0"/>
           </a:p>
@@ -4928,7 +4928,7 @@
             <a:fld id="{B61BEF0D-F0BB-DE4B-95CE-6DB70DBA9567}" type="datetimeFigureOut">
               <a:rPr lang="en-US" dirty="0"/>
               <a:pPr/>
-              <a:t>8/20/2020</a:t>
+              <a:t>10/27/2020</a:t>
             </a:fld>
             <a:endParaRPr lang="en-US" dirty="0"/>
           </a:p>

</xml_diff>

<commit_message>
Jata files changes 03/11/2020
</commit_message>
<xml_diff>
--- a/Veda Lectures/Veda Basics.pptx
+++ b/Veda Lectures/Veda Basics.pptx
@@ -70,6 +70,8 @@
     <p:sldId id="293" r:id="rId64"/>
     <p:sldId id="295" r:id="rId65"/>
     <p:sldId id="313" r:id="rId66"/>
+    <p:sldId id="329" r:id="rId67"/>
+    <p:sldId id="330" r:id="rId68"/>
   </p:sldIdLst>
   <p:sldSz cx="12192000" cy="6858000"/>
   <p:notesSz cx="6858000" cy="9144000"/>
@@ -246,6 +248,8 @@
             <p14:sldId id="293"/>
             <p14:sldId id="295"/>
             <p14:sldId id="313"/>
+            <p14:sldId id="329"/>
+            <p14:sldId id="330"/>
           </p14:sldIdLst>
         </p14:section>
       </p14:sectionLst>
@@ -449,7 +453,7 @@
             <a:fld id="{B61BEF0D-F0BB-DE4B-95CE-6DB70DBA9567}" type="datetimeFigureOut">
               <a:rPr lang="en-US" dirty="0"/>
               <a:pPr/>
-              <a:t>10/27/2020</a:t>
+              <a:t>11/3/2020</a:t>
             </a:fld>
             <a:endParaRPr lang="en-US" dirty="0"/>
           </a:p>
@@ -882,7 +886,7 @@
             <a:fld id="{B61BEF0D-F0BB-DE4B-95CE-6DB70DBA9567}" type="datetimeFigureOut">
               <a:rPr lang="en-US" dirty="0"/>
               <a:pPr/>
-              <a:t>10/27/2020</a:t>
+              <a:t>11/3/2020</a:t>
             </a:fld>
             <a:endParaRPr lang="en-US" dirty="0"/>
           </a:p>
@@ -1129,7 +1133,7 @@
             <a:fld id="{B61BEF0D-F0BB-DE4B-95CE-6DB70DBA9567}" type="datetimeFigureOut">
               <a:rPr lang="en-US" dirty="0"/>
               <a:pPr/>
-              <a:t>10/27/2020</a:t>
+              <a:t>11/3/2020</a:t>
             </a:fld>
             <a:endParaRPr lang="en-US" dirty="0"/>
           </a:p>
@@ -1434,7 +1438,7 @@
             <a:fld id="{B61BEF0D-F0BB-DE4B-95CE-6DB70DBA9567}" type="datetimeFigureOut">
               <a:rPr lang="en-US" dirty="0"/>
               <a:pPr/>
-              <a:t>10/27/2020</a:t>
+              <a:t>11/3/2020</a:t>
             </a:fld>
             <a:endParaRPr lang="en-US" dirty="0"/>
           </a:p>
@@ -1749,7 +1753,7 @@
             <a:fld id="{B61BEF0D-F0BB-DE4B-95CE-6DB70DBA9567}" type="datetimeFigureOut">
               <a:rPr lang="en-US" dirty="0"/>
               <a:pPr/>
-              <a:t>10/27/2020</a:t>
+              <a:t>11/3/2020</a:t>
             </a:fld>
             <a:endParaRPr lang="en-US" dirty="0"/>
           </a:p>
@@ -2048,7 +2052,7 @@
             <a:fld id="{B61BEF0D-F0BB-DE4B-95CE-6DB70DBA9567}" type="datetimeFigureOut">
               <a:rPr lang="en-US" dirty="0"/>
               <a:pPr/>
-              <a:t>10/27/2020</a:t>
+              <a:t>11/3/2020</a:t>
             </a:fld>
             <a:endParaRPr lang="en-US" dirty="0"/>
           </a:p>
@@ -2412,7 +2416,7 @@
             <a:fld id="{B61BEF0D-F0BB-DE4B-95CE-6DB70DBA9567}" type="datetimeFigureOut">
               <a:rPr lang="en-US" dirty="0"/>
               <a:pPr/>
-              <a:t>10/27/2020</a:t>
+              <a:t>11/3/2020</a:t>
             </a:fld>
             <a:endParaRPr lang="en-US" dirty="0"/>
           </a:p>
@@ -2583,7 +2587,7 @@
             <a:fld id="{B61BEF0D-F0BB-DE4B-95CE-6DB70DBA9567}" type="datetimeFigureOut">
               <a:rPr lang="en-US" dirty="0"/>
               <a:pPr/>
-              <a:t>10/27/2020</a:t>
+              <a:t>11/3/2020</a:t>
             </a:fld>
             <a:endParaRPr lang="en-US" dirty="0"/>
           </a:p>
@@ -2760,7 +2764,7 @@
             <a:fld id="{B61BEF0D-F0BB-DE4B-95CE-6DB70DBA9567}" type="datetimeFigureOut">
               <a:rPr lang="en-US" dirty="0"/>
               <a:pPr/>
-              <a:t>10/27/2020</a:t>
+              <a:t>11/3/2020</a:t>
             </a:fld>
             <a:endParaRPr lang="en-US" dirty="0"/>
           </a:p>
@@ -2927,7 +2931,7 @@
             <a:fld id="{B61BEF0D-F0BB-DE4B-95CE-6DB70DBA9567}" type="datetimeFigureOut">
               <a:rPr lang="en-US" dirty="0"/>
               <a:pPr/>
-              <a:t>10/27/2020</a:t>
+              <a:t>11/3/2020</a:t>
             </a:fld>
             <a:endParaRPr lang="en-US" dirty="0"/>
           </a:p>
@@ -3174,7 +3178,7 @@
             <a:fld id="{B61BEF0D-F0BB-DE4B-95CE-6DB70DBA9567}" type="datetimeFigureOut">
               <a:rPr lang="en-US" dirty="0"/>
               <a:pPr/>
-              <a:t>10/27/2020</a:t>
+              <a:t>11/3/2020</a:t>
             </a:fld>
             <a:endParaRPr lang="en-US" dirty="0"/>
           </a:p>
@@ -3407,7 +3411,7 @@
             <a:fld id="{B61BEF0D-F0BB-DE4B-95CE-6DB70DBA9567}" type="datetimeFigureOut">
               <a:rPr lang="en-US" dirty="0"/>
               <a:pPr/>
-              <a:t>10/27/2020</a:t>
+              <a:t>11/3/2020</a:t>
             </a:fld>
             <a:endParaRPr lang="en-US" dirty="0"/>
           </a:p>
@@ -3786,7 +3790,7 @@
             <a:fld id="{B61BEF0D-F0BB-DE4B-95CE-6DB70DBA9567}" type="datetimeFigureOut">
               <a:rPr lang="en-US" dirty="0"/>
               <a:pPr/>
-              <a:t>10/27/2020</a:t>
+              <a:t>11/3/2020</a:t>
             </a:fld>
             <a:endParaRPr lang="en-US" dirty="0"/>
           </a:p>
@@ -3901,7 +3905,7 @@
             <a:fld id="{B61BEF0D-F0BB-DE4B-95CE-6DB70DBA9567}" type="datetimeFigureOut">
               <a:rPr lang="en-US" dirty="0"/>
               <a:pPr/>
-              <a:t>10/27/2020</a:t>
+              <a:t>11/3/2020</a:t>
             </a:fld>
             <a:endParaRPr lang="en-US" dirty="0"/>
           </a:p>
@@ -3993,7 +3997,7 @@
             <a:fld id="{B61BEF0D-F0BB-DE4B-95CE-6DB70DBA9567}" type="datetimeFigureOut">
               <a:rPr lang="en-US" dirty="0"/>
               <a:pPr/>
-              <a:t>10/27/2020</a:t>
+              <a:t>11/3/2020</a:t>
             </a:fld>
             <a:endParaRPr lang="en-US" dirty="0"/>
           </a:p>
@@ -4245,7 +4249,7 @@
             <a:fld id="{B61BEF0D-F0BB-DE4B-95CE-6DB70DBA9567}" type="datetimeFigureOut">
               <a:rPr lang="en-US" dirty="0"/>
               <a:pPr/>
-              <a:t>10/27/2020</a:t>
+              <a:t>11/3/2020</a:t>
             </a:fld>
             <a:endParaRPr lang="en-US" dirty="0"/>
           </a:p>
@@ -4525,7 +4529,7 @@
             <a:fld id="{B61BEF0D-F0BB-DE4B-95CE-6DB70DBA9567}" type="datetimeFigureOut">
               <a:rPr lang="en-US" dirty="0"/>
               <a:pPr/>
-              <a:t>10/27/2020</a:t>
+              <a:t>11/3/2020</a:t>
             </a:fld>
             <a:endParaRPr lang="en-US" dirty="0"/>
           </a:p>
@@ -4928,7 +4932,7 @@
             <a:fld id="{B61BEF0D-F0BB-DE4B-95CE-6DB70DBA9567}" type="datetimeFigureOut">
               <a:rPr lang="en-US" dirty="0"/>
               <a:pPr/>
-              <a:t>10/27/2020</a:t>
+              <a:t>11/3/2020</a:t>
             </a:fld>
             <a:endParaRPr lang="en-US" dirty="0"/>
           </a:p>
@@ -16175,6 +16179,417 @@
 </p:sld>
 </file>
 
+<file path=ppt/slides/slide66.xml><?xml version="1.0" encoding="utf-8"?>
+<p:sld xmlns:a="http://schemas.openxmlformats.org/drawingml/2006/main" xmlns:r="http://schemas.openxmlformats.org/officeDocument/2006/relationships" xmlns:p="http://schemas.openxmlformats.org/presentationml/2006/main">
+  <p:cSld>
+    <p:spTree>
+      <p:nvGrpSpPr>
+        <p:cNvPr id="1" name=""/>
+        <p:cNvGrpSpPr/>
+        <p:nvPr/>
+      </p:nvGrpSpPr>
+      <p:grpSpPr>
+        <a:xfrm>
+          <a:off x="0" y="0"/>
+          <a:ext cx="0" cy="0"/>
+          <a:chOff x="0" y="0"/>
+          <a:chExt cx="0" cy="0"/>
+        </a:xfrm>
+      </p:grpSpPr>
+      <p:sp>
+        <p:nvSpPr>
+          <p:cNvPr id="2" name="Title 1"/>
+          <p:cNvSpPr>
+            <a:spLocks noGrp="1"/>
+          </p:cNvSpPr>
+          <p:nvPr>
+            <p:ph type="title"/>
+          </p:nvPr>
+        </p:nvSpPr>
+        <p:spPr/>
+        <p:txBody>
+          <a:bodyPr/>
+          <a:lstStyle/>
+          <a:p>
+            <a:r>
+              <a:rPr lang="en-US" dirty="0" smtClean="0"/>
+              <a:t>Summary for First Part - </a:t>
+            </a:r>
+            <a:r>
+              <a:rPr lang="en-US" dirty="0" err="1" smtClean="0"/>
+              <a:t>Swarams</a:t>
+            </a:r>
+            <a:endParaRPr lang="en-US" dirty="0"/>
+          </a:p>
+        </p:txBody>
+      </p:sp>
+      <p:sp>
+        <p:nvSpPr>
+          <p:cNvPr id="3" name="Content Placeholder 2"/>
+          <p:cNvSpPr>
+            <a:spLocks noGrp="1"/>
+          </p:cNvSpPr>
+          <p:nvPr>
+            <p:ph idx="1"/>
+          </p:nvPr>
+        </p:nvSpPr>
+        <p:spPr>
+          <a:xfrm>
+            <a:off x="684211" y="685800"/>
+            <a:ext cx="10128931" cy="4234543"/>
+          </a:xfrm>
+        </p:spPr>
+        <p:txBody>
+          <a:bodyPr>
+            <a:normAutofit/>
+          </a:bodyPr>
+          <a:lstStyle/>
+          <a:p>
+            <a:r>
+              <a:rPr lang="en-US" sz="2800" b="1" dirty="0" smtClean="0">
+                <a:latin typeface="Arial" panose="020B0604020202020204" pitchFamily="34" charset="0"/>
+                <a:cs typeface="Arial" panose="020B0604020202020204" pitchFamily="34" charset="0"/>
+              </a:rPr>
+              <a:t>We have seen definition of udAttam, anudAttam, Swaritam and Dheerga </a:t>
+            </a:r>
+            <a:r>
+              <a:rPr lang="en-US" sz="2800" b="1" dirty="0" err="1" smtClean="0">
+                <a:latin typeface="Arial" panose="020B0604020202020204" pitchFamily="34" charset="0"/>
+                <a:cs typeface="Arial" panose="020B0604020202020204" pitchFamily="34" charset="0"/>
+              </a:rPr>
+              <a:t>Swartiam</a:t>
+            </a:r>
+            <a:endParaRPr lang="en-US" sz="2800" b="1" dirty="0" smtClean="0">
+              <a:latin typeface="Arial" panose="020B0604020202020204" pitchFamily="34" charset="0"/>
+              <a:cs typeface="Arial" panose="020B0604020202020204" pitchFamily="34" charset="0"/>
+            </a:endParaRPr>
+          </a:p>
+          <a:p>
+            <a:pPr lvl="1"/>
+            <a:r>
+              <a:rPr lang="en-US" sz="2800" b="1" dirty="0" smtClean="0">
+                <a:latin typeface="Arial" panose="020B0604020202020204" pitchFamily="34" charset="0"/>
+                <a:cs typeface="Arial" panose="020B0604020202020204" pitchFamily="34" charset="0"/>
+              </a:rPr>
+              <a:t>How they are marked and how they have to be </a:t>
+            </a:r>
+            <a:r>
+              <a:rPr lang="en-US" sz="2800" b="1" dirty="0" err="1" smtClean="0">
+                <a:latin typeface="Arial" panose="020B0604020202020204" pitchFamily="34" charset="0"/>
+                <a:cs typeface="Arial" panose="020B0604020202020204" pitchFamily="34" charset="0"/>
+              </a:rPr>
+              <a:t>slided</a:t>
+            </a:r>
+            <a:endParaRPr lang="en-US" sz="2800" b="1" dirty="0" smtClean="0">
+              <a:latin typeface="Arial" panose="020B0604020202020204" pitchFamily="34" charset="0"/>
+              <a:cs typeface="Arial" panose="020B0604020202020204" pitchFamily="34" charset="0"/>
+            </a:endParaRPr>
+          </a:p>
+          <a:p>
+            <a:pPr lvl="1"/>
+            <a:r>
+              <a:rPr lang="en-US" sz="2800" b="1" dirty="0" smtClean="0">
+                <a:latin typeface="Arial" panose="020B0604020202020204" pitchFamily="34" charset="0"/>
+                <a:cs typeface="Arial" panose="020B0604020202020204" pitchFamily="34" charset="0"/>
+              </a:rPr>
+              <a:t>Only vowel part gets the sliding</a:t>
+            </a:r>
+          </a:p>
+          <a:p>
+            <a:pPr lvl="1"/>
+            <a:r>
+              <a:rPr lang="en-US" sz="2800" b="1" dirty="0" smtClean="0">
+                <a:latin typeface="Arial" panose="020B0604020202020204" pitchFamily="34" charset="0"/>
+                <a:cs typeface="Arial" panose="020B0604020202020204" pitchFamily="34" charset="0"/>
+              </a:rPr>
+              <a:t>Let us see pictorial view of sliding</a:t>
+            </a:r>
+          </a:p>
+          <a:p>
+            <a:r>
+              <a:rPr lang="en-US" sz="3000" b="1" dirty="0" smtClean="0">
+                <a:latin typeface="Arial" panose="020B0604020202020204" pitchFamily="34" charset="0"/>
+                <a:cs typeface="Arial" panose="020B0604020202020204" pitchFamily="34" charset="0"/>
+              </a:rPr>
+              <a:t>Now we will start about further classifications</a:t>
+            </a:r>
+          </a:p>
+          <a:p>
+            <a:pPr lvl="1"/>
+            <a:r>
+              <a:rPr lang="en-US" sz="2800" b="1" dirty="0" smtClean="0">
+                <a:latin typeface="Arial" panose="020B0604020202020204" pitchFamily="34" charset="0"/>
+                <a:cs typeface="Arial" panose="020B0604020202020204" pitchFamily="34" charset="0"/>
+              </a:rPr>
+              <a:t>Pracaya, </a:t>
+            </a:r>
+            <a:r>
+              <a:rPr lang="en-US" sz="2800" b="1" dirty="0" err="1" smtClean="0">
+                <a:latin typeface="Arial" panose="020B0604020202020204" pitchFamily="34" charset="0"/>
+                <a:cs typeface="Arial" panose="020B0604020202020204" pitchFamily="34" charset="0"/>
+              </a:rPr>
+              <a:t>sannatara</a:t>
+            </a:r>
+            <a:r>
+              <a:rPr lang="en-US" sz="2800" b="1" dirty="0" smtClean="0">
+                <a:latin typeface="Arial" panose="020B0604020202020204" pitchFamily="34" charset="0"/>
+                <a:cs typeface="Arial" panose="020B0604020202020204" pitchFamily="34" charset="0"/>
+              </a:rPr>
+              <a:t>, </a:t>
+            </a:r>
+            <a:r>
+              <a:rPr lang="en-US" sz="2800" b="1" dirty="0" err="1" smtClean="0">
+                <a:latin typeface="Arial" panose="020B0604020202020204" pitchFamily="34" charset="0"/>
+                <a:cs typeface="Arial" panose="020B0604020202020204" pitchFamily="34" charset="0"/>
+              </a:rPr>
+              <a:t>ekasruti</a:t>
+            </a:r>
+            <a:endParaRPr lang="en-US" sz="2800" b="1" dirty="0">
+              <a:latin typeface="Arial" panose="020B0604020202020204" pitchFamily="34" charset="0"/>
+              <a:cs typeface="Arial" panose="020B0604020202020204" pitchFamily="34" charset="0"/>
+            </a:endParaRPr>
+          </a:p>
+        </p:txBody>
+      </p:sp>
+    </p:spTree>
+    <p:extLst>
+      <p:ext uri="{BB962C8B-B14F-4D97-AF65-F5344CB8AC3E}">
+        <p14:creationId xmlns:p14="http://schemas.microsoft.com/office/powerpoint/2010/main" val="2905799788"/>
+      </p:ext>
+    </p:extLst>
+  </p:cSld>
+  <p:clrMapOvr>
+    <a:masterClrMapping/>
+  </p:clrMapOvr>
+</p:sld>
+</file>
+
+<file path=ppt/slides/slide67.xml><?xml version="1.0" encoding="utf-8"?>
+<p:sld xmlns:a="http://schemas.openxmlformats.org/drawingml/2006/main" xmlns:r="http://schemas.openxmlformats.org/officeDocument/2006/relationships" xmlns:p="http://schemas.openxmlformats.org/presentationml/2006/main">
+  <p:cSld>
+    <p:spTree>
+      <p:nvGrpSpPr>
+        <p:cNvPr id="1" name=""/>
+        <p:cNvGrpSpPr/>
+        <p:nvPr/>
+      </p:nvGrpSpPr>
+      <p:grpSpPr>
+        <a:xfrm>
+          <a:off x="0" y="0"/>
+          <a:ext cx="0" cy="0"/>
+          <a:chOff x="0" y="0"/>
+          <a:chExt cx="0" cy="0"/>
+        </a:xfrm>
+      </p:grpSpPr>
+      <p:sp>
+        <p:nvSpPr>
+          <p:cNvPr id="2" name="Title 1"/>
+          <p:cNvSpPr>
+            <a:spLocks noGrp="1"/>
+          </p:cNvSpPr>
+          <p:nvPr>
+            <p:ph type="title"/>
+          </p:nvPr>
+        </p:nvSpPr>
+        <p:spPr/>
+        <p:txBody>
+          <a:bodyPr/>
+          <a:lstStyle/>
+          <a:p>
+            <a:r>
+              <a:rPr lang="en-US" dirty="0" smtClean="0"/>
+              <a:t>Definition of pracaya</a:t>
+            </a:r>
+            <a:endParaRPr lang="en-US" dirty="0"/>
+          </a:p>
+        </p:txBody>
+      </p:sp>
+      <p:sp>
+        <p:nvSpPr>
+          <p:cNvPr id="3" name="Content Placeholder 2"/>
+          <p:cNvSpPr>
+            <a:spLocks noGrp="1"/>
+          </p:cNvSpPr>
+          <p:nvPr>
+            <p:ph idx="1"/>
+          </p:nvPr>
+        </p:nvSpPr>
+        <p:spPr/>
+        <p:txBody>
+          <a:bodyPr>
+            <a:normAutofit/>
+          </a:bodyPr>
+          <a:lstStyle/>
+          <a:p>
+            <a:r>
+              <a:rPr lang="en-US" sz="2800" b="1" dirty="0" smtClean="0">
+                <a:latin typeface="Arial" panose="020B0604020202020204" pitchFamily="34" charset="0"/>
+                <a:cs typeface="Arial" panose="020B0604020202020204" pitchFamily="34" charset="0"/>
+              </a:rPr>
+              <a:t>Pracaya is a collection or accumulation of letters that get a same </a:t>
+            </a:r>
+            <a:r>
+              <a:rPr lang="en-US" sz="2800" b="1" dirty="0" err="1" smtClean="0">
+                <a:latin typeface="Arial" panose="020B0604020202020204" pitchFamily="34" charset="0"/>
+                <a:cs typeface="Arial" panose="020B0604020202020204" pitchFamily="34" charset="0"/>
+              </a:rPr>
+              <a:t>Swara</a:t>
+            </a:r>
+            <a:r>
+              <a:rPr lang="en-US" sz="2800" b="1" dirty="0" smtClean="0">
+                <a:latin typeface="Arial" panose="020B0604020202020204" pitchFamily="34" charset="0"/>
+                <a:cs typeface="Arial" panose="020B0604020202020204" pitchFamily="34" charset="0"/>
+              </a:rPr>
+              <a:t> </a:t>
+            </a:r>
+          </a:p>
+          <a:p>
+            <a:pPr lvl="1"/>
+            <a:r>
+              <a:rPr lang="en-US" sz="2600" b="1" dirty="0" smtClean="0">
+                <a:latin typeface="Arial" panose="020B0604020202020204" pitchFamily="34" charset="0"/>
+                <a:cs typeface="Arial" panose="020B0604020202020204" pitchFamily="34" charset="0"/>
+              </a:rPr>
+              <a:t>Note example of </a:t>
+            </a:r>
+            <a:r>
+              <a:rPr lang="en-US" sz="2600" b="1" dirty="0" err="1" smtClean="0">
+                <a:latin typeface="Arial" panose="020B0604020202020204" pitchFamily="34" charset="0"/>
+                <a:cs typeface="Arial" panose="020B0604020202020204" pitchFamily="34" charset="0"/>
+              </a:rPr>
+              <a:t>SASanAnaSane</a:t>
+            </a:r>
+            <a:r>
+              <a:rPr lang="en-US" sz="2600" b="1" dirty="0" smtClean="0">
+                <a:latin typeface="Arial" panose="020B0604020202020204" pitchFamily="34" charset="0"/>
+                <a:cs typeface="Arial" panose="020B0604020202020204" pitchFamily="34" charset="0"/>
+              </a:rPr>
+              <a:t> </a:t>
+            </a:r>
+            <a:r>
+              <a:rPr lang="en-US" sz="2600" b="1" dirty="0" err="1" smtClean="0">
+                <a:latin typeface="Arial" panose="020B0604020202020204" pitchFamily="34" charset="0"/>
+                <a:cs typeface="Arial" panose="020B0604020202020204" pitchFamily="34" charset="0"/>
+              </a:rPr>
+              <a:t>Abi</a:t>
+            </a:r>
+            <a:endParaRPr lang="en-US" sz="2600" b="1" dirty="0" smtClean="0">
+              <a:latin typeface="Arial" panose="020B0604020202020204" pitchFamily="34" charset="0"/>
+              <a:cs typeface="Arial" panose="020B0604020202020204" pitchFamily="34" charset="0"/>
+            </a:endParaRPr>
+          </a:p>
+          <a:p>
+            <a:pPr lvl="1"/>
+            <a:r>
+              <a:rPr lang="en-US" sz="2600" b="1" dirty="0" smtClean="0">
+                <a:latin typeface="Arial" panose="020B0604020202020204" pitchFamily="34" charset="0"/>
+                <a:cs typeface="Arial" panose="020B0604020202020204" pitchFamily="34" charset="0"/>
+              </a:rPr>
+              <a:t>Note example of </a:t>
+            </a:r>
+            <a:r>
+              <a:rPr lang="en-US" sz="2600" b="1" dirty="0" err="1" smtClean="0">
+                <a:latin typeface="Arial" panose="020B0604020202020204" pitchFamily="34" charset="0"/>
+                <a:cs typeface="Arial" panose="020B0604020202020204" pitchFamily="34" charset="0"/>
+              </a:rPr>
+              <a:t>Ganapathi</a:t>
+            </a:r>
+            <a:r>
+              <a:rPr lang="en-US" sz="2600" b="1" dirty="0" smtClean="0">
+                <a:latin typeface="Arial" panose="020B0604020202020204" pitchFamily="34" charset="0"/>
+                <a:cs typeface="Arial" panose="020B0604020202020204" pitchFamily="34" charset="0"/>
+              </a:rPr>
+              <a:t>(</a:t>
+            </a:r>
+            <a:r>
+              <a:rPr lang="en-US" sz="2600" b="1" dirty="0" err="1" smtClean="0">
+                <a:latin typeface="Arial" panose="020B0604020202020204" pitchFamily="34" charset="0"/>
+                <a:cs typeface="Arial" panose="020B0604020202020204" pitchFamily="34" charset="0"/>
+              </a:rPr>
+              <a:t>gm</a:t>
+            </a:r>
+            <a:r>
+              <a:rPr lang="en-US" sz="2600" b="1" dirty="0" smtClean="0">
+                <a:latin typeface="Arial" panose="020B0604020202020204" pitchFamily="34" charset="0"/>
+                <a:cs typeface="Arial" panose="020B0604020202020204" pitchFamily="34" charset="0"/>
+              </a:rPr>
+              <a:t>) </a:t>
+            </a:r>
+            <a:r>
+              <a:rPr lang="en-US" sz="2600" b="1" dirty="0" err="1" smtClean="0">
+                <a:latin typeface="Arial" panose="020B0604020202020204" pitchFamily="34" charset="0"/>
+                <a:cs typeface="Arial" panose="020B0604020202020204" pitchFamily="34" charset="0"/>
+              </a:rPr>
+              <a:t>havAmahe</a:t>
+            </a:r>
+            <a:endParaRPr lang="en-US" sz="2600" b="1" dirty="0" smtClean="0">
+              <a:latin typeface="Arial" panose="020B0604020202020204" pitchFamily="34" charset="0"/>
+              <a:cs typeface="Arial" panose="020B0604020202020204" pitchFamily="34" charset="0"/>
+            </a:endParaRPr>
+          </a:p>
+          <a:p>
+            <a:r>
+              <a:rPr lang="en-US" sz="2800" b="1" dirty="0" smtClean="0">
+                <a:latin typeface="Arial" panose="020B0604020202020204" pitchFamily="34" charset="0"/>
+                <a:cs typeface="Arial" panose="020B0604020202020204" pitchFamily="34" charset="0"/>
+              </a:rPr>
+              <a:t>Definition of </a:t>
+            </a:r>
+            <a:r>
+              <a:rPr lang="en-US" sz="2800" b="1" dirty="0" err="1" smtClean="0">
+                <a:latin typeface="Arial" panose="020B0604020202020204" pitchFamily="34" charset="0"/>
+                <a:cs typeface="Arial" panose="020B0604020202020204" pitchFamily="34" charset="0"/>
+              </a:rPr>
+              <a:t>pANini</a:t>
+            </a:r>
+            <a:r>
+              <a:rPr lang="en-US" sz="2800" b="1" dirty="0" smtClean="0">
+                <a:latin typeface="Arial" panose="020B0604020202020204" pitchFamily="34" charset="0"/>
+                <a:cs typeface="Arial" panose="020B0604020202020204" pitchFamily="34" charset="0"/>
+              </a:rPr>
+              <a:t> as </a:t>
+            </a:r>
+            <a:r>
+              <a:rPr lang="en-US" sz="2800" b="1" dirty="0" err="1" smtClean="0">
+                <a:latin typeface="Arial" panose="020B0604020202020204" pitchFamily="34" charset="0"/>
+                <a:cs typeface="Arial" panose="020B0604020202020204" pitchFamily="34" charset="0"/>
+              </a:rPr>
+              <a:t>Sannatara</a:t>
+            </a:r>
+            <a:r>
+              <a:rPr lang="en-US" sz="2800" b="1" dirty="0" smtClean="0">
+                <a:latin typeface="Arial" panose="020B0604020202020204" pitchFamily="34" charset="0"/>
+                <a:cs typeface="Arial" panose="020B0604020202020204" pitchFamily="34" charset="0"/>
+              </a:rPr>
+              <a:t> and </a:t>
+            </a:r>
+            <a:r>
+              <a:rPr lang="en-US" sz="2800" b="1" dirty="0" err="1" smtClean="0">
+                <a:latin typeface="Arial" panose="020B0604020202020204" pitchFamily="34" charset="0"/>
+                <a:cs typeface="Arial" panose="020B0604020202020204" pitchFamily="34" charset="0"/>
+              </a:rPr>
+              <a:t>ekasruti</a:t>
+            </a:r>
+            <a:endParaRPr lang="en-US" sz="2800" b="1" dirty="0">
+              <a:latin typeface="Arial" panose="020B0604020202020204" pitchFamily="34" charset="0"/>
+              <a:cs typeface="Arial" panose="020B0604020202020204" pitchFamily="34" charset="0"/>
+            </a:endParaRPr>
+          </a:p>
+        </p:txBody>
+      </p:sp>
+    </p:spTree>
+    <p:extLst>
+      <p:ext uri="{BB962C8B-B14F-4D97-AF65-F5344CB8AC3E}">
+        <p14:creationId xmlns:p14="http://schemas.microsoft.com/office/powerpoint/2010/main" val="4199646022"/>
+      </p:ext>
+    </p:extLst>
+  </p:cSld>
+  <p:clrMapOvr>
+    <a:masterClrMapping/>
+  </p:clrMapOvr>
+</p:sld>
+</file>
+
 <file path=ppt/slides/slide7.xml><?xml version="1.0" encoding="utf-8"?>
 <p:sld xmlns:a="http://schemas.openxmlformats.org/drawingml/2006/main" xmlns:r="http://schemas.openxmlformats.org/officeDocument/2006/relationships" xmlns:p="http://schemas.openxmlformats.org/presentationml/2006/main">
   <p:cSld>

</xml_diff>

<commit_message>
TS PP 3.2 Sanskrit corrections sethu 13/11/2020
</commit_message>
<xml_diff>
--- a/Veda Lectures/Veda Basics.pptx
+++ b/Veda Lectures/Veda Basics.pptx
@@ -453,7 +453,7 @@
             <a:fld id="{B61BEF0D-F0BB-DE4B-95CE-6DB70DBA9567}" type="datetimeFigureOut">
               <a:rPr lang="en-US" dirty="0"/>
               <a:pPr/>
-              <a:t>11/3/2020</a:t>
+              <a:t>11/11/2020</a:t>
             </a:fld>
             <a:endParaRPr lang="en-US" dirty="0"/>
           </a:p>
@@ -886,7 +886,7 @@
             <a:fld id="{B61BEF0D-F0BB-DE4B-95CE-6DB70DBA9567}" type="datetimeFigureOut">
               <a:rPr lang="en-US" dirty="0"/>
               <a:pPr/>
-              <a:t>11/3/2020</a:t>
+              <a:t>11/11/2020</a:t>
             </a:fld>
             <a:endParaRPr lang="en-US" dirty="0"/>
           </a:p>
@@ -1133,7 +1133,7 @@
             <a:fld id="{B61BEF0D-F0BB-DE4B-95CE-6DB70DBA9567}" type="datetimeFigureOut">
               <a:rPr lang="en-US" dirty="0"/>
               <a:pPr/>
-              <a:t>11/3/2020</a:t>
+              <a:t>11/11/2020</a:t>
             </a:fld>
             <a:endParaRPr lang="en-US" dirty="0"/>
           </a:p>
@@ -1438,7 +1438,7 @@
             <a:fld id="{B61BEF0D-F0BB-DE4B-95CE-6DB70DBA9567}" type="datetimeFigureOut">
               <a:rPr lang="en-US" dirty="0"/>
               <a:pPr/>
-              <a:t>11/3/2020</a:t>
+              <a:t>11/11/2020</a:t>
             </a:fld>
             <a:endParaRPr lang="en-US" dirty="0"/>
           </a:p>
@@ -1753,7 +1753,7 @@
             <a:fld id="{B61BEF0D-F0BB-DE4B-95CE-6DB70DBA9567}" type="datetimeFigureOut">
               <a:rPr lang="en-US" dirty="0"/>
               <a:pPr/>
-              <a:t>11/3/2020</a:t>
+              <a:t>11/11/2020</a:t>
             </a:fld>
             <a:endParaRPr lang="en-US" dirty="0"/>
           </a:p>
@@ -2052,7 +2052,7 @@
             <a:fld id="{B61BEF0D-F0BB-DE4B-95CE-6DB70DBA9567}" type="datetimeFigureOut">
               <a:rPr lang="en-US" dirty="0"/>
               <a:pPr/>
-              <a:t>11/3/2020</a:t>
+              <a:t>11/11/2020</a:t>
             </a:fld>
             <a:endParaRPr lang="en-US" dirty="0"/>
           </a:p>
@@ -2416,7 +2416,7 @@
             <a:fld id="{B61BEF0D-F0BB-DE4B-95CE-6DB70DBA9567}" type="datetimeFigureOut">
               <a:rPr lang="en-US" dirty="0"/>
               <a:pPr/>
-              <a:t>11/3/2020</a:t>
+              <a:t>11/11/2020</a:t>
             </a:fld>
             <a:endParaRPr lang="en-US" dirty="0"/>
           </a:p>
@@ -2587,7 +2587,7 @@
             <a:fld id="{B61BEF0D-F0BB-DE4B-95CE-6DB70DBA9567}" type="datetimeFigureOut">
               <a:rPr lang="en-US" dirty="0"/>
               <a:pPr/>
-              <a:t>11/3/2020</a:t>
+              <a:t>11/11/2020</a:t>
             </a:fld>
             <a:endParaRPr lang="en-US" dirty="0"/>
           </a:p>
@@ -2764,7 +2764,7 @@
             <a:fld id="{B61BEF0D-F0BB-DE4B-95CE-6DB70DBA9567}" type="datetimeFigureOut">
               <a:rPr lang="en-US" dirty="0"/>
               <a:pPr/>
-              <a:t>11/3/2020</a:t>
+              <a:t>11/11/2020</a:t>
             </a:fld>
             <a:endParaRPr lang="en-US" dirty="0"/>
           </a:p>
@@ -2931,7 +2931,7 @@
             <a:fld id="{B61BEF0D-F0BB-DE4B-95CE-6DB70DBA9567}" type="datetimeFigureOut">
               <a:rPr lang="en-US" dirty="0"/>
               <a:pPr/>
-              <a:t>11/3/2020</a:t>
+              <a:t>11/11/2020</a:t>
             </a:fld>
             <a:endParaRPr lang="en-US" dirty="0"/>
           </a:p>
@@ -3178,7 +3178,7 @@
             <a:fld id="{B61BEF0D-F0BB-DE4B-95CE-6DB70DBA9567}" type="datetimeFigureOut">
               <a:rPr lang="en-US" dirty="0"/>
               <a:pPr/>
-              <a:t>11/3/2020</a:t>
+              <a:t>11/11/2020</a:t>
             </a:fld>
             <a:endParaRPr lang="en-US" dirty="0"/>
           </a:p>
@@ -3411,7 +3411,7 @@
             <a:fld id="{B61BEF0D-F0BB-DE4B-95CE-6DB70DBA9567}" type="datetimeFigureOut">
               <a:rPr lang="en-US" dirty="0"/>
               <a:pPr/>
-              <a:t>11/3/2020</a:t>
+              <a:t>11/11/2020</a:t>
             </a:fld>
             <a:endParaRPr lang="en-US" dirty="0"/>
           </a:p>
@@ -3790,7 +3790,7 @@
             <a:fld id="{B61BEF0D-F0BB-DE4B-95CE-6DB70DBA9567}" type="datetimeFigureOut">
               <a:rPr lang="en-US" dirty="0"/>
               <a:pPr/>
-              <a:t>11/3/2020</a:t>
+              <a:t>11/11/2020</a:t>
             </a:fld>
             <a:endParaRPr lang="en-US" dirty="0"/>
           </a:p>
@@ -3905,7 +3905,7 @@
             <a:fld id="{B61BEF0D-F0BB-DE4B-95CE-6DB70DBA9567}" type="datetimeFigureOut">
               <a:rPr lang="en-US" dirty="0"/>
               <a:pPr/>
-              <a:t>11/3/2020</a:t>
+              <a:t>11/11/2020</a:t>
             </a:fld>
             <a:endParaRPr lang="en-US" dirty="0"/>
           </a:p>
@@ -3997,7 +3997,7 @@
             <a:fld id="{B61BEF0D-F0BB-DE4B-95CE-6DB70DBA9567}" type="datetimeFigureOut">
               <a:rPr lang="en-US" dirty="0"/>
               <a:pPr/>
-              <a:t>11/3/2020</a:t>
+              <a:t>11/11/2020</a:t>
             </a:fld>
             <a:endParaRPr lang="en-US" dirty="0"/>
           </a:p>
@@ -4249,7 +4249,7 @@
             <a:fld id="{B61BEF0D-F0BB-DE4B-95CE-6DB70DBA9567}" type="datetimeFigureOut">
               <a:rPr lang="en-US" dirty="0"/>
               <a:pPr/>
-              <a:t>11/3/2020</a:t>
+              <a:t>11/11/2020</a:t>
             </a:fld>
             <a:endParaRPr lang="en-US" dirty="0"/>
           </a:p>
@@ -4529,7 +4529,7 @@
             <a:fld id="{B61BEF0D-F0BB-DE4B-95CE-6DB70DBA9567}" type="datetimeFigureOut">
               <a:rPr lang="en-US" dirty="0"/>
               <a:pPr/>
-              <a:t>11/3/2020</a:t>
+              <a:t>11/11/2020</a:t>
             </a:fld>
             <a:endParaRPr lang="en-US" dirty="0"/>
           </a:p>
@@ -4932,7 +4932,7 @@
             <a:fld id="{B61BEF0D-F0BB-DE4B-95CE-6DB70DBA9567}" type="datetimeFigureOut">
               <a:rPr lang="en-US" dirty="0"/>
               <a:pPr/>
-              <a:t>11/3/2020</a:t>
+              <a:t>11/11/2020</a:t>
             </a:fld>
             <a:endParaRPr lang="en-US" dirty="0"/>
           </a:p>
@@ -16253,11 +16253,11 @@
               <a:t>We have seen definition of udAttam, anudAttam, Swaritam and Dheerga </a:t>
             </a:r>
             <a:r>
-              <a:rPr lang="en-US" sz="2800" b="1" dirty="0" err="1" smtClean="0">
+              <a:rPr lang="en-US" sz="2800" b="1" dirty="0" smtClean="0">
                 <a:latin typeface="Arial" panose="020B0604020202020204" pitchFamily="34" charset="0"/>
                 <a:cs typeface="Arial" panose="020B0604020202020204" pitchFamily="34" charset="0"/>
               </a:rPr>
-              <a:t>Swartiam</a:t>
+              <a:t>Swaritam</a:t>
             </a:r>
             <a:endParaRPr lang="en-US" sz="2800" b="1" dirty="0" smtClean="0">
               <a:latin typeface="Arial" panose="020B0604020202020204" pitchFamily="34" charset="0"/>
@@ -16271,19 +16271,8 @@
                 <a:latin typeface="Arial" panose="020B0604020202020204" pitchFamily="34" charset="0"/>
                 <a:cs typeface="Arial" panose="020B0604020202020204" pitchFamily="34" charset="0"/>
               </a:rPr>
-              <a:t>How they are marked and how they have to be </a:t>
-            </a:r>
-            <a:r>
-              <a:rPr lang="en-US" sz="2800" b="1" dirty="0" err="1" smtClean="0">
-                <a:latin typeface="Arial" panose="020B0604020202020204" pitchFamily="34" charset="0"/>
-                <a:cs typeface="Arial" panose="020B0604020202020204" pitchFamily="34" charset="0"/>
-              </a:rPr>
-              <a:t>slided</a:t>
-            </a:r>
-            <a:endParaRPr lang="en-US" sz="2800" b="1" dirty="0" smtClean="0">
-              <a:latin typeface="Arial" panose="020B0604020202020204" pitchFamily="34" charset="0"/>
-              <a:cs typeface="Arial" panose="020B0604020202020204" pitchFamily="34" charset="0"/>
-            </a:endParaRPr>
+              <a:t>How they are marked and how they have to be slided</a:t>
+            </a:r>
           </a:p>
           <a:p>
             <a:pPr lvl="1"/>

</xml_diff>

<commit_message>
Change to Article, Padam template corr 08/01/2021
</commit_message>
<xml_diff>
--- a/Veda Lectures/Veda Basics.pptx
+++ b/Veda Lectures/Veda Basics.pptx
@@ -453,7 +453,7 @@
             <a:fld id="{B61BEF0D-F0BB-DE4B-95CE-6DB70DBA9567}" type="datetimeFigureOut">
               <a:rPr lang="en-US" dirty="0"/>
               <a:pPr/>
-              <a:t>11/11/2020</a:t>
+              <a:t>1/8/2021</a:t>
             </a:fld>
             <a:endParaRPr lang="en-US" dirty="0"/>
           </a:p>
@@ -886,7 +886,7 @@
             <a:fld id="{B61BEF0D-F0BB-DE4B-95CE-6DB70DBA9567}" type="datetimeFigureOut">
               <a:rPr lang="en-US" dirty="0"/>
               <a:pPr/>
-              <a:t>11/11/2020</a:t>
+              <a:t>1/8/2021</a:t>
             </a:fld>
             <a:endParaRPr lang="en-US" dirty="0"/>
           </a:p>
@@ -1133,7 +1133,7 @@
             <a:fld id="{B61BEF0D-F0BB-DE4B-95CE-6DB70DBA9567}" type="datetimeFigureOut">
               <a:rPr lang="en-US" dirty="0"/>
               <a:pPr/>
-              <a:t>11/11/2020</a:t>
+              <a:t>1/8/2021</a:t>
             </a:fld>
             <a:endParaRPr lang="en-US" dirty="0"/>
           </a:p>
@@ -1438,7 +1438,7 @@
             <a:fld id="{B61BEF0D-F0BB-DE4B-95CE-6DB70DBA9567}" type="datetimeFigureOut">
               <a:rPr lang="en-US" dirty="0"/>
               <a:pPr/>
-              <a:t>11/11/2020</a:t>
+              <a:t>1/8/2021</a:t>
             </a:fld>
             <a:endParaRPr lang="en-US" dirty="0"/>
           </a:p>
@@ -1753,7 +1753,7 @@
             <a:fld id="{B61BEF0D-F0BB-DE4B-95CE-6DB70DBA9567}" type="datetimeFigureOut">
               <a:rPr lang="en-US" dirty="0"/>
               <a:pPr/>
-              <a:t>11/11/2020</a:t>
+              <a:t>1/8/2021</a:t>
             </a:fld>
             <a:endParaRPr lang="en-US" dirty="0"/>
           </a:p>
@@ -2052,7 +2052,7 @@
             <a:fld id="{B61BEF0D-F0BB-DE4B-95CE-6DB70DBA9567}" type="datetimeFigureOut">
               <a:rPr lang="en-US" dirty="0"/>
               <a:pPr/>
-              <a:t>11/11/2020</a:t>
+              <a:t>1/8/2021</a:t>
             </a:fld>
             <a:endParaRPr lang="en-US" dirty="0"/>
           </a:p>
@@ -2416,7 +2416,7 @@
             <a:fld id="{B61BEF0D-F0BB-DE4B-95CE-6DB70DBA9567}" type="datetimeFigureOut">
               <a:rPr lang="en-US" dirty="0"/>
               <a:pPr/>
-              <a:t>11/11/2020</a:t>
+              <a:t>1/8/2021</a:t>
             </a:fld>
             <a:endParaRPr lang="en-US" dirty="0"/>
           </a:p>
@@ -2587,7 +2587,7 @@
             <a:fld id="{B61BEF0D-F0BB-DE4B-95CE-6DB70DBA9567}" type="datetimeFigureOut">
               <a:rPr lang="en-US" dirty="0"/>
               <a:pPr/>
-              <a:t>11/11/2020</a:t>
+              <a:t>1/8/2021</a:t>
             </a:fld>
             <a:endParaRPr lang="en-US" dirty="0"/>
           </a:p>
@@ -2764,7 +2764,7 @@
             <a:fld id="{B61BEF0D-F0BB-DE4B-95CE-6DB70DBA9567}" type="datetimeFigureOut">
               <a:rPr lang="en-US" dirty="0"/>
               <a:pPr/>
-              <a:t>11/11/2020</a:t>
+              <a:t>1/8/2021</a:t>
             </a:fld>
             <a:endParaRPr lang="en-US" dirty="0"/>
           </a:p>
@@ -2931,7 +2931,7 @@
             <a:fld id="{B61BEF0D-F0BB-DE4B-95CE-6DB70DBA9567}" type="datetimeFigureOut">
               <a:rPr lang="en-US" dirty="0"/>
               <a:pPr/>
-              <a:t>11/11/2020</a:t>
+              <a:t>1/8/2021</a:t>
             </a:fld>
             <a:endParaRPr lang="en-US" dirty="0"/>
           </a:p>
@@ -3178,7 +3178,7 @@
             <a:fld id="{B61BEF0D-F0BB-DE4B-95CE-6DB70DBA9567}" type="datetimeFigureOut">
               <a:rPr lang="en-US" dirty="0"/>
               <a:pPr/>
-              <a:t>11/11/2020</a:t>
+              <a:t>1/8/2021</a:t>
             </a:fld>
             <a:endParaRPr lang="en-US" dirty="0"/>
           </a:p>
@@ -3411,7 +3411,7 @@
             <a:fld id="{B61BEF0D-F0BB-DE4B-95CE-6DB70DBA9567}" type="datetimeFigureOut">
               <a:rPr lang="en-US" dirty="0"/>
               <a:pPr/>
-              <a:t>11/11/2020</a:t>
+              <a:t>1/8/2021</a:t>
             </a:fld>
             <a:endParaRPr lang="en-US" dirty="0"/>
           </a:p>
@@ -3790,7 +3790,7 @@
             <a:fld id="{B61BEF0D-F0BB-DE4B-95CE-6DB70DBA9567}" type="datetimeFigureOut">
               <a:rPr lang="en-US" dirty="0"/>
               <a:pPr/>
-              <a:t>11/11/2020</a:t>
+              <a:t>1/8/2021</a:t>
             </a:fld>
             <a:endParaRPr lang="en-US" dirty="0"/>
           </a:p>
@@ -3905,7 +3905,7 @@
             <a:fld id="{B61BEF0D-F0BB-DE4B-95CE-6DB70DBA9567}" type="datetimeFigureOut">
               <a:rPr lang="en-US" dirty="0"/>
               <a:pPr/>
-              <a:t>11/11/2020</a:t>
+              <a:t>1/8/2021</a:t>
             </a:fld>
             <a:endParaRPr lang="en-US" dirty="0"/>
           </a:p>
@@ -3997,7 +3997,7 @@
             <a:fld id="{B61BEF0D-F0BB-DE4B-95CE-6DB70DBA9567}" type="datetimeFigureOut">
               <a:rPr lang="en-US" dirty="0"/>
               <a:pPr/>
-              <a:t>11/11/2020</a:t>
+              <a:t>1/8/2021</a:t>
             </a:fld>
             <a:endParaRPr lang="en-US" dirty="0"/>
           </a:p>
@@ -4249,7 +4249,7 @@
             <a:fld id="{B61BEF0D-F0BB-DE4B-95CE-6DB70DBA9567}" type="datetimeFigureOut">
               <a:rPr lang="en-US" dirty="0"/>
               <a:pPr/>
-              <a:t>11/11/2020</a:t>
+              <a:t>1/8/2021</a:t>
             </a:fld>
             <a:endParaRPr lang="en-US" dirty="0"/>
           </a:p>
@@ -4529,7 +4529,7 @@
             <a:fld id="{B61BEF0D-F0BB-DE4B-95CE-6DB70DBA9567}" type="datetimeFigureOut">
               <a:rPr lang="en-US" dirty="0"/>
               <a:pPr/>
-              <a:t>11/11/2020</a:t>
+              <a:t>1/8/2021</a:t>
             </a:fld>
             <a:endParaRPr lang="en-US" dirty="0"/>
           </a:p>
@@ -4932,7 +4932,7 @@
             <a:fld id="{B61BEF0D-F0BB-DE4B-95CE-6DB70DBA9567}" type="datetimeFigureOut">
               <a:rPr lang="en-US" dirty="0"/>
               <a:pPr/>
-              <a:t>11/11/2020</a:t>
+              <a:t>1/8/2021</a:t>
             </a:fld>
             <a:endParaRPr lang="en-US" dirty="0"/>
           </a:p>
@@ -16250,19 +16250,8 @@
                 <a:latin typeface="Arial" panose="020B0604020202020204" pitchFamily="34" charset="0"/>
                 <a:cs typeface="Arial" panose="020B0604020202020204" pitchFamily="34" charset="0"/>
               </a:rPr>
-              <a:t>We have seen definition of udAttam, anudAttam, Swaritam and Dheerga </a:t>
-            </a:r>
-            <a:r>
-              <a:rPr lang="en-US" sz="2800" b="1" dirty="0" smtClean="0">
-                <a:latin typeface="Arial" panose="020B0604020202020204" pitchFamily="34" charset="0"/>
-                <a:cs typeface="Arial" panose="020B0604020202020204" pitchFamily="34" charset="0"/>
-              </a:rPr>
-              <a:t>Swaritam</a:t>
-            </a:r>
-            <a:endParaRPr lang="en-US" sz="2800" b="1" dirty="0" smtClean="0">
-              <a:latin typeface="Arial" panose="020B0604020202020204" pitchFamily="34" charset="0"/>
-              <a:cs typeface="Arial" panose="020B0604020202020204" pitchFamily="34" charset="0"/>
-            </a:endParaRPr>
+              <a:t>We have seen definition of udAttam, anudAttam, Swaritam and Dheerga Swaritam</a:t>
+            </a:r>
           </a:p>
           <a:p>
             <a:pPr lvl="1"/>
@@ -16510,6 +16499,48 @@
                 <a:cs typeface="Arial" panose="020B0604020202020204" pitchFamily="34" charset="0"/>
               </a:rPr>
               <a:t>havAmahe</a:t>
+            </a:r>
+            <a:endParaRPr lang="en-US" sz="2600" b="1" dirty="0" smtClean="0">
+              <a:latin typeface="Arial" panose="020B0604020202020204" pitchFamily="34" charset="0"/>
+              <a:cs typeface="Arial" panose="020B0604020202020204" pitchFamily="34" charset="0"/>
+            </a:endParaRPr>
+          </a:p>
+          <a:p>
+            <a:pPr lvl="1"/>
+            <a:r>
+              <a:rPr lang="en-US" sz="2600" b="1" dirty="0" smtClean="0">
+                <a:latin typeface="Arial" panose="020B0604020202020204" pitchFamily="34" charset="0"/>
+                <a:cs typeface="Arial" panose="020B0604020202020204" pitchFamily="34" charset="0"/>
+              </a:rPr>
+              <a:t>Note example of </a:t>
+            </a:r>
+            <a:r>
+              <a:rPr lang="en-US" sz="2600" b="1" dirty="0" err="1" smtClean="0">
+                <a:latin typeface="Arial" panose="020B0604020202020204" pitchFamily="34" charset="0"/>
+                <a:cs typeface="Arial" panose="020B0604020202020204" pitchFamily="34" charset="0"/>
+              </a:rPr>
+              <a:t>hiraNyabAhave</a:t>
+            </a:r>
+            <a:r>
+              <a:rPr lang="en-US" sz="2600" b="1" dirty="0" smtClean="0">
+                <a:latin typeface="Arial" panose="020B0604020202020204" pitchFamily="34" charset="0"/>
+                <a:cs typeface="Arial" panose="020B0604020202020204" pitchFamily="34" charset="0"/>
+              </a:rPr>
+              <a:t> </a:t>
+            </a:r>
+            <a:r>
+              <a:rPr lang="en-US" sz="2600" b="1" dirty="0" err="1" smtClean="0">
+                <a:latin typeface="Arial" panose="020B0604020202020204" pitchFamily="34" charset="0"/>
+                <a:cs typeface="Arial" panose="020B0604020202020204" pitchFamily="34" charset="0"/>
+              </a:rPr>
+              <a:t>sEnAnye</a:t>
+            </a:r>
+            <a:r>
+              <a:rPr lang="en-US" sz="2600" b="1" dirty="0" smtClean="0">
+                <a:latin typeface="Arial" panose="020B0604020202020204" pitchFamily="34" charset="0"/>
+                <a:cs typeface="Arial" panose="020B0604020202020204" pitchFamily="34" charset="0"/>
+              </a:rPr>
+              <a:t> </a:t>
             </a:r>
             <a:endParaRPr lang="en-US" sz="2600" b="1" dirty="0" smtClean="0">
               <a:latin typeface="Arial" panose="020B0604020202020204" pitchFamily="34" charset="0"/>

</xml_diff>

<commit_message>
TS PP 4.4 and 4.5 TS 4 Corrections 11/01/2021
</commit_message>
<xml_diff>
--- a/Veda Lectures/Veda Basics.pptx
+++ b/Veda Lectures/Veda Basics.pptx
@@ -453,7 +453,7 @@
             <a:fld id="{B61BEF0D-F0BB-DE4B-95CE-6DB70DBA9567}" type="datetimeFigureOut">
               <a:rPr lang="en-US" dirty="0"/>
               <a:pPr/>
-              <a:t>1/8/2021</a:t>
+              <a:t>1/10/2021</a:t>
             </a:fld>
             <a:endParaRPr lang="en-US" dirty="0"/>
           </a:p>
@@ -886,7 +886,7 @@
             <a:fld id="{B61BEF0D-F0BB-DE4B-95CE-6DB70DBA9567}" type="datetimeFigureOut">
               <a:rPr lang="en-US" dirty="0"/>
               <a:pPr/>
-              <a:t>1/8/2021</a:t>
+              <a:t>1/10/2021</a:t>
             </a:fld>
             <a:endParaRPr lang="en-US" dirty="0"/>
           </a:p>
@@ -1133,7 +1133,7 @@
             <a:fld id="{B61BEF0D-F0BB-DE4B-95CE-6DB70DBA9567}" type="datetimeFigureOut">
               <a:rPr lang="en-US" dirty="0"/>
               <a:pPr/>
-              <a:t>1/8/2021</a:t>
+              <a:t>1/10/2021</a:t>
             </a:fld>
             <a:endParaRPr lang="en-US" dirty="0"/>
           </a:p>
@@ -1438,7 +1438,7 @@
             <a:fld id="{B61BEF0D-F0BB-DE4B-95CE-6DB70DBA9567}" type="datetimeFigureOut">
               <a:rPr lang="en-US" dirty="0"/>
               <a:pPr/>
-              <a:t>1/8/2021</a:t>
+              <a:t>1/10/2021</a:t>
             </a:fld>
             <a:endParaRPr lang="en-US" dirty="0"/>
           </a:p>
@@ -1753,7 +1753,7 @@
             <a:fld id="{B61BEF0D-F0BB-DE4B-95CE-6DB70DBA9567}" type="datetimeFigureOut">
               <a:rPr lang="en-US" dirty="0"/>
               <a:pPr/>
-              <a:t>1/8/2021</a:t>
+              <a:t>1/10/2021</a:t>
             </a:fld>
             <a:endParaRPr lang="en-US" dirty="0"/>
           </a:p>
@@ -2052,7 +2052,7 @@
             <a:fld id="{B61BEF0D-F0BB-DE4B-95CE-6DB70DBA9567}" type="datetimeFigureOut">
               <a:rPr lang="en-US" dirty="0"/>
               <a:pPr/>
-              <a:t>1/8/2021</a:t>
+              <a:t>1/10/2021</a:t>
             </a:fld>
             <a:endParaRPr lang="en-US" dirty="0"/>
           </a:p>
@@ -2416,7 +2416,7 @@
             <a:fld id="{B61BEF0D-F0BB-DE4B-95CE-6DB70DBA9567}" type="datetimeFigureOut">
               <a:rPr lang="en-US" dirty="0"/>
               <a:pPr/>
-              <a:t>1/8/2021</a:t>
+              <a:t>1/10/2021</a:t>
             </a:fld>
             <a:endParaRPr lang="en-US" dirty="0"/>
           </a:p>
@@ -2587,7 +2587,7 @@
             <a:fld id="{B61BEF0D-F0BB-DE4B-95CE-6DB70DBA9567}" type="datetimeFigureOut">
               <a:rPr lang="en-US" dirty="0"/>
               <a:pPr/>
-              <a:t>1/8/2021</a:t>
+              <a:t>1/10/2021</a:t>
             </a:fld>
             <a:endParaRPr lang="en-US" dirty="0"/>
           </a:p>
@@ -2764,7 +2764,7 @@
             <a:fld id="{B61BEF0D-F0BB-DE4B-95CE-6DB70DBA9567}" type="datetimeFigureOut">
               <a:rPr lang="en-US" dirty="0"/>
               <a:pPr/>
-              <a:t>1/8/2021</a:t>
+              <a:t>1/10/2021</a:t>
             </a:fld>
             <a:endParaRPr lang="en-US" dirty="0"/>
           </a:p>
@@ -2931,7 +2931,7 @@
             <a:fld id="{B61BEF0D-F0BB-DE4B-95CE-6DB70DBA9567}" type="datetimeFigureOut">
               <a:rPr lang="en-US" dirty="0"/>
               <a:pPr/>
-              <a:t>1/8/2021</a:t>
+              <a:t>1/10/2021</a:t>
             </a:fld>
             <a:endParaRPr lang="en-US" dirty="0"/>
           </a:p>
@@ -3178,7 +3178,7 @@
             <a:fld id="{B61BEF0D-F0BB-DE4B-95CE-6DB70DBA9567}" type="datetimeFigureOut">
               <a:rPr lang="en-US" dirty="0"/>
               <a:pPr/>
-              <a:t>1/8/2021</a:t>
+              <a:t>1/10/2021</a:t>
             </a:fld>
             <a:endParaRPr lang="en-US" dirty="0"/>
           </a:p>
@@ -3411,7 +3411,7 @@
             <a:fld id="{B61BEF0D-F0BB-DE4B-95CE-6DB70DBA9567}" type="datetimeFigureOut">
               <a:rPr lang="en-US" dirty="0"/>
               <a:pPr/>
-              <a:t>1/8/2021</a:t>
+              <a:t>1/10/2021</a:t>
             </a:fld>
             <a:endParaRPr lang="en-US" dirty="0"/>
           </a:p>
@@ -3790,7 +3790,7 @@
             <a:fld id="{B61BEF0D-F0BB-DE4B-95CE-6DB70DBA9567}" type="datetimeFigureOut">
               <a:rPr lang="en-US" dirty="0"/>
               <a:pPr/>
-              <a:t>1/8/2021</a:t>
+              <a:t>1/10/2021</a:t>
             </a:fld>
             <a:endParaRPr lang="en-US" dirty="0"/>
           </a:p>
@@ -3905,7 +3905,7 @@
             <a:fld id="{B61BEF0D-F0BB-DE4B-95CE-6DB70DBA9567}" type="datetimeFigureOut">
               <a:rPr lang="en-US" dirty="0"/>
               <a:pPr/>
-              <a:t>1/8/2021</a:t>
+              <a:t>1/10/2021</a:t>
             </a:fld>
             <a:endParaRPr lang="en-US" dirty="0"/>
           </a:p>
@@ -3997,7 +3997,7 @@
             <a:fld id="{B61BEF0D-F0BB-DE4B-95CE-6DB70DBA9567}" type="datetimeFigureOut">
               <a:rPr lang="en-US" dirty="0"/>
               <a:pPr/>
-              <a:t>1/8/2021</a:t>
+              <a:t>1/10/2021</a:t>
             </a:fld>
             <a:endParaRPr lang="en-US" dirty="0"/>
           </a:p>
@@ -4249,7 +4249,7 @@
             <a:fld id="{B61BEF0D-F0BB-DE4B-95CE-6DB70DBA9567}" type="datetimeFigureOut">
               <a:rPr lang="en-US" dirty="0"/>
               <a:pPr/>
-              <a:t>1/8/2021</a:t>
+              <a:t>1/10/2021</a:t>
             </a:fld>
             <a:endParaRPr lang="en-US" dirty="0"/>
           </a:p>
@@ -4529,7 +4529,7 @@
             <a:fld id="{B61BEF0D-F0BB-DE4B-95CE-6DB70DBA9567}" type="datetimeFigureOut">
               <a:rPr lang="en-US" dirty="0"/>
               <a:pPr/>
-              <a:t>1/8/2021</a:t>
+              <a:t>1/10/2021</a:t>
             </a:fld>
             <a:endParaRPr lang="en-US" dirty="0"/>
           </a:p>
@@ -4932,7 +4932,7 @@
             <a:fld id="{B61BEF0D-F0BB-DE4B-95CE-6DB70DBA9567}" type="datetimeFigureOut">
               <a:rPr lang="en-US" dirty="0"/>
               <a:pPr/>
-              <a:t>1/8/2021</a:t>
+              <a:t>1/10/2021</a:t>
             </a:fld>
             <a:endParaRPr lang="en-US" dirty="0"/>
           </a:p>
@@ -16542,10 +16542,6 @@
               </a:rPr>
               <a:t> </a:t>
             </a:r>
-            <a:endParaRPr lang="en-US" sz="2600" b="1" dirty="0" smtClean="0">
-              <a:latin typeface="Arial" panose="020B0604020202020204" pitchFamily="34" charset="0"/>
-              <a:cs typeface="Arial" panose="020B0604020202020204" pitchFamily="34" charset="0"/>
-            </a:endParaRPr>
           </a:p>
           <a:p>
             <a:r>

</xml_diff>

<commit_message>
All edits of Templates, Chamakam for Raja 31/01/2021
</commit_message>
<xml_diff>
--- a/Veda Lectures/Veda Basics.pptx
+++ b/Veda Lectures/Veda Basics.pptx
@@ -453,7 +453,7 @@
             <a:fld id="{B61BEF0D-F0BB-DE4B-95CE-6DB70DBA9567}" type="datetimeFigureOut">
               <a:rPr lang="en-US" dirty="0"/>
               <a:pPr/>
-              <a:t>1/10/2021</a:t>
+              <a:t>1/29/2021</a:t>
             </a:fld>
             <a:endParaRPr lang="en-US" dirty="0"/>
           </a:p>
@@ -886,7 +886,7 @@
             <a:fld id="{B61BEF0D-F0BB-DE4B-95CE-6DB70DBA9567}" type="datetimeFigureOut">
               <a:rPr lang="en-US" dirty="0"/>
               <a:pPr/>
-              <a:t>1/10/2021</a:t>
+              <a:t>1/29/2021</a:t>
             </a:fld>
             <a:endParaRPr lang="en-US" dirty="0"/>
           </a:p>
@@ -1133,7 +1133,7 @@
             <a:fld id="{B61BEF0D-F0BB-DE4B-95CE-6DB70DBA9567}" type="datetimeFigureOut">
               <a:rPr lang="en-US" dirty="0"/>
               <a:pPr/>
-              <a:t>1/10/2021</a:t>
+              <a:t>1/29/2021</a:t>
             </a:fld>
             <a:endParaRPr lang="en-US" dirty="0"/>
           </a:p>
@@ -1438,7 +1438,7 @@
             <a:fld id="{B61BEF0D-F0BB-DE4B-95CE-6DB70DBA9567}" type="datetimeFigureOut">
               <a:rPr lang="en-US" dirty="0"/>
               <a:pPr/>
-              <a:t>1/10/2021</a:t>
+              <a:t>1/29/2021</a:t>
             </a:fld>
             <a:endParaRPr lang="en-US" dirty="0"/>
           </a:p>
@@ -1753,7 +1753,7 @@
             <a:fld id="{B61BEF0D-F0BB-DE4B-95CE-6DB70DBA9567}" type="datetimeFigureOut">
               <a:rPr lang="en-US" dirty="0"/>
               <a:pPr/>
-              <a:t>1/10/2021</a:t>
+              <a:t>1/29/2021</a:t>
             </a:fld>
             <a:endParaRPr lang="en-US" dirty="0"/>
           </a:p>
@@ -2052,7 +2052,7 @@
             <a:fld id="{B61BEF0D-F0BB-DE4B-95CE-6DB70DBA9567}" type="datetimeFigureOut">
               <a:rPr lang="en-US" dirty="0"/>
               <a:pPr/>
-              <a:t>1/10/2021</a:t>
+              <a:t>1/29/2021</a:t>
             </a:fld>
             <a:endParaRPr lang="en-US" dirty="0"/>
           </a:p>
@@ -2416,7 +2416,7 @@
             <a:fld id="{B61BEF0D-F0BB-DE4B-95CE-6DB70DBA9567}" type="datetimeFigureOut">
               <a:rPr lang="en-US" dirty="0"/>
               <a:pPr/>
-              <a:t>1/10/2021</a:t>
+              <a:t>1/29/2021</a:t>
             </a:fld>
             <a:endParaRPr lang="en-US" dirty="0"/>
           </a:p>
@@ -2587,7 +2587,7 @@
             <a:fld id="{B61BEF0D-F0BB-DE4B-95CE-6DB70DBA9567}" type="datetimeFigureOut">
               <a:rPr lang="en-US" dirty="0"/>
               <a:pPr/>
-              <a:t>1/10/2021</a:t>
+              <a:t>1/29/2021</a:t>
             </a:fld>
             <a:endParaRPr lang="en-US" dirty="0"/>
           </a:p>
@@ -2764,7 +2764,7 @@
             <a:fld id="{B61BEF0D-F0BB-DE4B-95CE-6DB70DBA9567}" type="datetimeFigureOut">
               <a:rPr lang="en-US" dirty="0"/>
               <a:pPr/>
-              <a:t>1/10/2021</a:t>
+              <a:t>1/29/2021</a:t>
             </a:fld>
             <a:endParaRPr lang="en-US" dirty="0"/>
           </a:p>
@@ -2931,7 +2931,7 @@
             <a:fld id="{B61BEF0D-F0BB-DE4B-95CE-6DB70DBA9567}" type="datetimeFigureOut">
               <a:rPr lang="en-US" dirty="0"/>
               <a:pPr/>
-              <a:t>1/10/2021</a:t>
+              <a:t>1/29/2021</a:t>
             </a:fld>
             <a:endParaRPr lang="en-US" dirty="0"/>
           </a:p>
@@ -3178,7 +3178,7 @@
             <a:fld id="{B61BEF0D-F0BB-DE4B-95CE-6DB70DBA9567}" type="datetimeFigureOut">
               <a:rPr lang="en-US" dirty="0"/>
               <a:pPr/>
-              <a:t>1/10/2021</a:t>
+              <a:t>1/29/2021</a:t>
             </a:fld>
             <a:endParaRPr lang="en-US" dirty="0"/>
           </a:p>
@@ -3411,7 +3411,7 @@
             <a:fld id="{B61BEF0D-F0BB-DE4B-95CE-6DB70DBA9567}" type="datetimeFigureOut">
               <a:rPr lang="en-US" dirty="0"/>
               <a:pPr/>
-              <a:t>1/10/2021</a:t>
+              <a:t>1/29/2021</a:t>
             </a:fld>
             <a:endParaRPr lang="en-US" dirty="0"/>
           </a:p>
@@ -3790,7 +3790,7 @@
             <a:fld id="{B61BEF0D-F0BB-DE4B-95CE-6DB70DBA9567}" type="datetimeFigureOut">
               <a:rPr lang="en-US" dirty="0"/>
               <a:pPr/>
-              <a:t>1/10/2021</a:t>
+              <a:t>1/29/2021</a:t>
             </a:fld>
             <a:endParaRPr lang="en-US" dirty="0"/>
           </a:p>
@@ -3905,7 +3905,7 @@
             <a:fld id="{B61BEF0D-F0BB-DE4B-95CE-6DB70DBA9567}" type="datetimeFigureOut">
               <a:rPr lang="en-US" dirty="0"/>
               <a:pPr/>
-              <a:t>1/10/2021</a:t>
+              <a:t>1/29/2021</a:t>
             </a:fld>
             <a:endParaRPr lang="en-US" dirty="0"/>
           </a:p>
@@ -3997,7 +3997,7 @@
             <a:fld id="{B61BEF0D-F0BB-DE4B-95CE-6DB70DBA9567}" type="datetimeFigureOut">
               <a:rPr lang="en-US" dirty="0"/>
               <a:pPr/>
-              <a:t>1/10/2021</a:t>
+              <a:t>1/29/2021</a:t>
             </a:fld>
             <a:endParaRPr lang="en-US" dirty="0"/>
           </a:p>
@@ -4249,7 +4249,7 @@
             <a:fld id="{B61BEF0D-F0BB-DE4B-95CE-6DB70DBA9567}" type="datetimeFigureOut">
               <a:rPr lang="en-US" dirty="0"/>
               <a:pPr/>
-              <a:t>1/10/2021</a:t>
+              <a:t>1/29/2021</a:t>
             </a:fld>
             <a:endParaRPr lang="en-US" dirty="0"/>
           </a:p>
@@ -4529,7 +4529,7 @@
             <a:fld id="{B61BEF0D-F0BB-DE4B-95CE-6DB70DBA9567}" type="datetimeFigureOut">
               <a:rPr lang="en-US" dirty="0"/>
               <a:pPr/>
-              <a:t>1/10/2021</a:t>
+              <a:t>1/29/2021</a:t>
             </a:fld>
             <a:endParaRPr lang="en-US" dirty="0"/>
           </a:p>
@@ -4932,7 +4932,7 @@
             <a:fld id="{B61BEF0D-F0BB-DE4B-95CE-6DB70DBA9567}" type="datetimeFigureOut">
               <a:rPr lang="en-US" dirty="0"/>
               <a:pPr/>
-              <a:t>1/10/2021</a:t>
+              <a:t>1/29/2021</a:t>
             </a:fld>
             <a:endParaRPr lang="en-US" dirty="0"/>
           </a:p>

</xml_diff>

<commit_message>
Chamaka Ghanam diff and GS 06/02/2021
</commit_message>
<xml_diff>
--- a/Veda Lectures/Veda Basics.pptx
+++ b/Veda Lectures/Veda Basics.pptx
@@ -43,9 +43,9 @@
     <p:sldId id="275" r:id="rId37"/>
     <p:sldId id="317" r:id="rId38"/>
     <p:sldId id="269" r:id="rId39"/>
-    <p:sldId id="276" r:id="rId40"/>
-    <p:sldId id="301" r:id="rId41"/>
-    <p:sldId id="278" r:id="rId42"/>
+    <p:sldId id="278" r:id="rId40"/>
+    <p:sldId id="276" r:id="rId41"/>
+    <p:sldId id="301" r:id="rId42"/>
     <p:sldId id="279" r:id="rId43"/>
     <p:sldId id="283" r:id="rId44"/>
     <p:sldId id="280" r:id="rId45"/>
@@ -213,9 +213,9 @@
             <p14:sldId id="275"/>
             <p14:sldId id="317"/>
             <p14:sldId id="269"/>
+            <p14:sldId id="278"/>
             <p14:sldId id="276"/>
             <p14:sldId id="301"/>
-            <p14:sldId id="278"/>
           </p14:sldIdLst>
         </p14:section>
         <p14:section name="Sound Source &amp; Letters" id="{F7046024-FBFB-4CCE-8F61-5A6A15711C6E}">
@@ -453,7 +453,7 @@
             <a:fld id="{B61BEF0D-F0BB-DE4B-95CE-6DB70DBA9567}" type="datetimeFigureOut">
               <a:rPr lang="en-US" dirty="0"/>
               <a:pPr/>
-              <a:t>2/3/2021</a:t>
+              <a:t>2/5/2021</a:t>
             </a:fld>
             <a:endParaRPr lang="en-US" dirty="0"/>
           </a:p>
@@ -886,7 +886,7 @@
             <a:fld id="{B61BEF0D-F0BB-DE4B-95CE-6DB70DBA9567}" type="datetimeFigureOut">
               <a:rPr lang="en-US" dirty="0"/>
               <a:pPr/>
-              <a:t>2/3/2021</a:t>
+              <a:t>2/5/2021</a:t>
             </a:fld>
             <a:endParaRPr lang="en-US" dirty="0"/>
           </a:p>
@@ -1133,7 +1133,7 @@
             <a:fld id="{B61BEF0D-F0BB-DE4B-95CE-6DB70DBA9567}" type="datetimeFigureOut">
               <a:rPr lang="en-US" dirty="0"/>
               <a:pPr/>
-              <a:t>2/3/2021</a:t>
+              <a:t>2/5/2021</a:t>
             </a:fld>
             <a:endParaRPr lang="en-US" dirty="0"/>
           </a:p>
@@ -1438,7 +1438,7 @@
             <a:fld id="{B61BEF0D-F0BB-DE4B-95CE-6DB70DBA9567}" type="datetimeFigureOut">
               <a:rPr lang="en-US" dirty="0"/>
               <a:pPr/>
-              <a:t>2/3/2021</a:t>
+              <a:t>2/5/2021</a:t>
             </a:fld>
             <a:endParaRPr lang="en-US" dirty="0"/>
           </a:p>
@@ -1753,7 +1753,7 @@
             <a:fld id="{B61BEF0D-F0BB-DE4B-95CE-6DB70DBA9567}" type="datetimeFigureOut">
               <a:rPr lang="en-US" dirty="0"/>
               <a:pPr/>
-              <a:t>2/3/2021</a:t>
+              <a:t>2/5/2021</a:t>
             </a:fld>
             <a:endParaRPr lang="en-US" dirty="0"/>
           </a:p>
@@ -2052,7 +2052,7 @@
             <a:fld id="{B61BEF0D-F0BB-DE4B-95CE-6DB70DBA9567}" type="datetimeFigureOut">
               <a:rPr lang="en-US" dirty="0"/>
               <a:pPr/>
-              <a:t>2/3/2021</a:t>
+              <a:t>2/5/2021</a:t>
             </a:fld>
             <a:endParaRPr lang="en-US" dirty="0"/>
           </a:p>
@@ -2416,7 +2416,7 @@
             <a:fld id="{B61BEF0D-F0BB-DE4B-95CE-6DB70DBA9567}" type="datetimeFigureOut">
               <a:rPr lang="en-US" dirty="0"/>
               <a:pPr/>
-              <a:t>2/3/2021</a:t>
+              <a:t>2/5/2021</a:t>
             </a:fld>
             <a:endParaRPr lang="en-US" dirty="0"/>
           </a:p>
@@ -2587,7 +2587,7 @@
             <a:fld id="{B61BEF0D-F0BB-DE4B-95CE-6DB70DBA9567}" type="datetimeFigureOut">
               <a:rPr lang="en-US" dirty="0"/>
               <a:pPr/>
-              <a:t>2/3/2021</a:t>
+              <a:t>2/5/2021</a:t>
             </a:fld>
             <a:endParaRPr lang="en-US" dirty="0"/>
           </a:p>
@@ -2764,7 +2764,7 @@
             <a:fld id="{B61BEF0D-F0BB-DE4B-95CE-6DB70DBA9567}" type="datetimeFigureOut">
               <a:rPr lang="en-US" dirty="0"/>
               <a:pPr/>
-              <a:t>2/3/2021</a:t>
+              <a:t>2/5/2021</a:t>
             </a:fld>
             <a:endParaRPr lang="en-US" dirty="0"/>
           </a:p>
@@ -2931,7 +2931,7 @@
             <a:fld id="{B61BEF0D-F0BB-DE4B-95CE-6DB70DBA9567}" type="datetimeFigureOut">
               <a:rPr lang="en-US" dirty="0"/>
               <a:pPr/>
-              <a:t>2/3/2021</a:t>
+              <a:t>2/5/2021</a:t>
             </a:fld>
             <a:endParaRPr lang="en-US" dirty="0"/>
           </a:p>
@@ -3178,7 +3178,7 @@
             <a:fld id="{B61BEF0D-F0BB-DE4B-95CE-6DB70DBA9567}" type="datetimeFigureOut">
               <a:rPr lang="en-US" dirty="0"/>
               <a:pPr/>
-              <a:t>2/3/2021</a:t>
+              <a:t>2/5/2021</a:t>
             </a:fld>
             <a:endParaRPr lang="en-US" dirty="0"/>
           </a:p>
@@ -3411,7 +3411,7 @@
             <a:fld id="{B61BEF0D-F0BB-DE4B-95CE-6DB70DBA9567}" type="datetimeFigureOut">
               <a:rPr lang="en-US" dirty="0"/>
               <a:pPr/>
-              <a:t>2/3/2021</a:t>
+              <a:t>2/5/2021</a:t>
             </a:fld>
             <a:endParaRPr lang="en-US" dirty="0"/>
           </a:p>
@@ -3790,7 +3790,7 @@
             <a:fld id="{B61BEF0D-F0BB-DE4B-95CE-6DB70DBA9567}" type="datetimeFigureOut">
               <a:rPr lang="en-US" dirty="0"/>
               <a:pPr/>
-              <a:t>2/3/2021</a:t>
+              <a:t>2/5/2021</a:t>
             </a:fld>
             <a:endParaRPr lang="en-US" dirty="0"/>
           </a:p>
@@ -3905,7 +3905,7 @@
             <a:fld id="{B61BEF0D-F0BB-DE4B-95CE-6DB70DBA9567}" type="datetimeFigureOut">
               <a:rPr lang="en-US" dirty="0"/>
               <a:pPr/>
-              <a:t>2/3/2021</a:t>
+              <a:t>2/5/2021</a:t>
             </a:fld>
             <a:endParaRPr lang="en-US" dirty="0"/>
           </a:p>
@@ -3997,7 +3997,7 @@
             <a:fld id="{B61BEF0D-F0BB-DE4B-95CE-6DB70DBA9567}" type="datetimeFigureOut">
               <a:rPr lang="en-US" dirty="0"/>
               <a:pPr/>
-              <a:t>2/3/2021</a:t>
+              <a:t>2/5/2021</a:t>
             </a:fld>
             <a:endParaRPr lang="en-US" dirty="0"/>
           </a:p>
@@ -4249,7 +4249,7 @@
             <a:fld id="{B61BEF0D-F0BB-DE4B-95CE-6DB70DBA9567}" type="datetimeFigureOut">
               <a:rPr lang="en-US" dirty="0"/>
               <a:pPr/>
-              <a:t>2/3/2021</a:t>
+              <a:t>2/5/2021</a:t>
             </a:fld>
             <a:endParaRPr lang="en-US" dirty="0"/>
           </a:p>
@@ -4529,7 +4529,7 @@
             <a:fld id="{B61BEF0D-F0BB-DE4B-95CE-6DB70DBA9567}" type="datetimeFigureOut">
               <a:rPr lang="en-US" dirty="0"/>
               <a:pPr/>
-              <a:t>2/3/2021</a:t>
+              <a:t>2/5/2021</a:t>
             </a:fld>
             <a:endParaRPr lang="en-US" dirty="0"/>
           </a:p>
@@ -4932,7 +4932,7 @@
             <a:fld id="{B61BEF0D-F0BB-DE4B-95CE-6DB70DBA9567}" type="datetimeFigureOut">
               <a:rPr lang="en-US" dirty="0"/>
               <a:pPr/>
-              <a:t>2/3/2021</a:t>
+              <a:t>2/5/2021</a:t>
             </a:fld>
             <a:endParaRPr lang="en-US" dirty="0"/>
           </a:p>
@@ -9074,8 +9074,17 @@
               <a:rPr lang="en-US" sz="2400" b="1" dirty="0">
                 <a:cs typeface="Arial" panose="020B0604020202020204" pitchFamily="34" charset="0"/>
               </a:rPr>
-              <a:t>Learning example of King Janaka</a:t>
-            </a:r>
+              <a:t>Learning example of King Janaka with </a:t>
+            </a:r>
+            <a:r>
+              <a:rPr lang="en-US" sz="2400" b="1">
+                <a:cs typeface="Arial" panose="020B0604020202020204" pitchFamily="34" charset="0"/>
+              </a:rPr>
+              <a:t>ashtavakra</a:t>
+            </a:r>
+            <a:endParaRPr lang="en-US" sz="2400" b="1" dirty="0">
+              <a:cs typeface="Arial" panose="020B0604020202020204" pitchFamily="34" charset="0"/>
+            </a:endParaRPr>
           </a:p>
         </p:txBody>
       </p:sp>
@@ -10329,17 +10338,19 @@
         </p:nvSpPr>
         <p:spPr>
           <a:xfrm>
-            <a:off x="629621" y="5745707"/>
-            <a:ext cx="7681865" cy="655094"/>
-          </a:xfrm>
-        </p:spPr>
-        <p:txBody>
-          <a:bodyPr/>
+            <a:off x="534087" y="5377218"/>
+            <a:ext cx="8534400" cy="1094853"/>
+          </a:xfrm>
+        </p:spPr>
+        <p:txBody>
+          <a:bodyPr>
+            <a:normAutofit fontScale="90000"/>
+          </a:bodyPr>
           <a:lstStyle/>
           <a:p>
             <a:r>
               <a:rPr lang="en-US" dirty="0"/>
-              <a:t>Learning in PataShala</a:t>
+              <a:t>Effects of misuse or Wrong rendition</a:t>
             </a:r>
           </a:p>
         </p:txBody>
@@ -10356,130 +10367,69 @@
         </p:nvSpPr>
         <p:spPr>
           <a:xfrm>
-            <a:off x="409433" y="204716"/>
-            <a:ext cx="11081982" cy="5540991"/>
+            <a:off x="684212" y="532893"/>
+            <a:ext cx="8534400" cy="3954439"/>
           </a:xfrm>
         </p:spPr>
         <p:txBody>
           <a:bodyPr>
-            <a:normAutofit fontScale="47500" lnSpcReduction="20000"/>
+            <a:noAutofit/>
           </a:bodyPr>
           <a:lstStyle/>
           <a:p>
-            <a:endParaRPr lang="en-US" sz="2600" b="1" dirty="0">
-              <a:latin typeface="Arial" panose="020B0604020202020204" pitchFamily="34" charset="0"/>
-              <a:cs typeface="Arial" panose="020B0604020202020204" pitchFamily="34" charset="0"/>
-            </a:endParaRPr>
-          </a:p>
-          <a:p>
-            <a:r>
-              <a:rPr lang="en-US" sz="5100" b="1" dirty="0">
-                <a:cs typeface="Arial" panose="020B0604020202020204" pitchFamily="34" charset="0"/>
-              </a:rPr>
-              <a:t>Minimum Seven to eight years to complete</a:t>
-            </a:r>
-          </a:p>
-          <a:p>
-            <a:pPr lvl="1"/>
-            <a:r>
-              <a:rPr lang="en-US" sz="5100" b="1" dirty="0">
-                <a:cs typeface="Arial" panose="020B0604020202020204" pitchFamily="34" charset="0"/>
-              </a:rPr>
-              <a:t>SamhitA, BrAhmaNam, Aranyam</a:t>
-            </a:r>
-          </a:p>
-          <a:p>
-            <a:pPr lvl="1"/>
-            <a:r>
-              <a:rPr lang="en-US" sz="5100" b="1" dirty="0">
-                <a:cs typeface="Arial" panose="020B0604020202020204" pitchFamily="34" charset="0"/>
-              </a:rPr>
-              <a:t>Pada PAtam and Kramam for SamhitA</a:t>
-            </a:r>
-          </a:p>
-          <a:p>
-            <a:pPr lvl="1"/>
-            <a:r>
-              <a:rPr lang="en-US" sz="5100" b="1" dirty="0">
-                <a:cs typeface="Arial" panose="020B0604020202020204" pitchFamily="34" charset="0"/>
-              </a:rPr>
-              <a:t>Various Sastras, standard karma vidhis and procedures</a:t>
-            </a:r>
-          </a:p>
-          <a:p>
-            <a:pPr lvl="1"/>
-            <a:r>
-              <a:rPr lang="en-US" sz="5100" b="1" dirty="0">
-                <a:cs typeface="Arial" panose="020B0604020202020204" pitchFamily="34" charset="0"/>
-              </a:rPr>
-              <a:t>Basic Grammar Rules get covered</a:t>
-            </a:r>
-          </a:p>
-          <a:p>
-            <a:r>
-              <a:rPr lang="en-US" sz="5100" b="1" dirty="0">
-                <a:cs typeface="Arial" panose="020B0604020202020204" pitchFamily="34" charset="0"/>
-              </a:rPr>
-              <a:t>Additional 18-24 months for Jata PAtam</a:t>
-            </a:r>
-          </a:p>
-          <a:p>
-            <a:r>
-              <a:rPr lang="en-US" sz="5100" b="1" dirty="0">
-                <a:cs typeface="Arial" panose="020B0604020202020204" pitchFamily="34" charset="0"/>
-              </a:rPr>
-              <a:t>Additional 18-24 months for Ghana Paatam</a:t>
-            </a:r>
-          </a:p>
-          <a:p>
-            <a:r>
-              <a:rPr lang="en-US" sz="5100" b="1" dirty="0">
-                <a:cs typeface="Arial" panose="020B0604020202020204" pitchFamily="34" charset="0"/>
-              </a:rPr>
-              <a:t>Additional 18-24 months for VarNa Kramam</a:t>
-            </a:r>
-          </a:p>
-          <a:p>
-            <a:pPr lvl="1"/>
-            <a:r>
-              <a:rPr lang="en-US" sz="5100" b="1" dirty="0">
-                <a:cs typeface="Arial" panose="020B0604020202020204" pitchFamily="34" charset="0"/>
-              </a:rPr>
-              <a:t>Combined Study and conceptual learning can shorten overall time depending on time involved, Guru available</a:t>
-            </a:r>
-          </a:p>
-          <a:p>
-            <a:r>
-              <a:rPr lang="en-US" sz="5100" b="1" dirty="0">
-                <a:cs typeface="Arial" panose="020B0604020202020204" pitchFamily="34" charset="0"/>
-              </a:rPr>
-              <a:t>Tough examinations to Pass to get the titles</a:t>
-            </a:r>
-          </a:p>
-          <a:p>
-            <a:endParaRPr lang="en-US" dirty="0"/>
-          </a:p>
-          <a:p>
-            <a:pPr marL="457200" lvl="1" indent="0">
-              <a:buNone/>
-            </a:pPr>
-            <a:r>
-              <a:rPr lang="en-US" dirty="0"/>
-              <a:t>	</a:t>
-            </a:r>
-          </a:p>
-          <a:p>
-            <a:pPr marL="457200" lvl="1" indent="0">
-              <a:buNone/>
-            </a:pPr>
-            <a:endParaRPr lang="en-US" dirty="0"/>
+            <a:r>
+              <a:rPr lang="en-US" sz="2400" b="1" dirty="0">
+                <a:cs typeface="Arial" panose="020B0604020202020204" pitchFamily="34" charset="0"/>
+              </a:rPr>
+              <a:t>Many times you intend saying the opposite</a:t>
+            </a:r>
+          </a:p>
+          <a:p>
+            <a:r>
+              <a:rPr lang="en-US" sz="2400" b="1" dirty="0">
+                <a:cs typeface="Arial" panose="020B0604020202020204" pitchFamily="34" charset="0"/>
+              </a:rPr>
+              <a:t>The body reacts to wrongly intended vibration</a:t>
+            </a:r>
+          </a:p>
+          <a:p>
+            <a:r>
+              <a:rPr lang="en-US" sz="2400" b="1" dirty="0">
+                <a:cs typeface="Arial" panose="020B0604020202020204" pitchFamily="34" charset="0"/>
+              </a:rPr>
+              <a:t>Reflected as physical problems or mental problems</a:t>
+            </a:r>
+          </a:p>
+          <a:p>
+            <a:r>
+              <a:rPr lang="en-US" sz="2400" b="1" dirty="0">
+                <a:cs typeface="Arial" panose="020B0604020202020204" pitchFamily="34" charset="0"/>
+              </a:rPr>
+              <a:t>Right pronunciation, speed and rendering style very critical</a:t>
+            </a:r>
+          </a:p>
+          <a:p>
+            <a:r>
+              <a:rPr lang="en-US" sz="2400" b="1" dirty="0">
+                <a:cs typeface="Arial" panose="020B0604020202020204" pitchFamily="34" charset="0"/>
+              </a:rPr>
+              <a:t>Sage Vyasa warns about consequences of rendering Veda mantras.</a:t>
+            </a:r>
+          </a:p>
+          <a:p>
+            <a:r>
+              <a:rPr lang="en-US" sz="2400" b="1" dirty="0">
+                <a:cs typeface="Arial" panose="020B0604020202020204" pitchFamily="34" charset="0"/>
+              </a:rPr>
+              <a:t>One needs discipline with Food intake and personal habits</a:t>
+            </a:r>
           </a:p>
         </p:txBody>
       </p:sp>
     </p:spTree>
     <p:extLst>
       <p:ext uri="{BB962C8B-B14F-4D97-AF65-F5344CB8AC3E}">
-        <p14:creationId xmlns:p14="http://schemas.microsoft.com/office/powerpoint/2010/main" val="2285695278"/>
+        <p14:creationId xmlns:p14="http://schemas.microsoft.com/office/powerpoint/2010/main" val="1201309700"/>
       </p:ext>
     </p:extLst>
   </p:cSld>
@@ -10648,8 +10598,8 @@
         </p:nvSpPr>
         <p:spPr>
           <a:xfrm>
-            <a:off x="684212" y="5431809"/>
-            <a:ext cx="8534400" cy="972023"/>
+            <a:off x="629621" y="5745707"/>
+            <a:ext cx="7681865" cy="655094"/>
           </a:xfrm>
         </p:spPr>
         <p:txBody>
@@ -10658,7 +10608,7 @@
           <a:p>
             <a:r>
               <a:rPr lang="en-US" dirty="0"/>
-              <a:t>Studies and Specialisation</a:t>
+              <a:t>Learning in PataShala</a:t>
             </a:r>
           </a:p>
         </p:txBody>
@@ -10675,59 +10625,148 @@
         </p:nvSpPr>
         <p:spPr>
           <a:xfrm>
-            <a:off x="684212" y="272955"/>
-            <a:ext cx="9729030" cy="5281684"/>
+            <a:off x="409433" y="204716"/>
+            <a:ext cx="11081982" cy="5540991"/>
           </a:xfrm>
         </p:spPr>
         <p:txBody>
           <a:bodyPr>
-            <a:normAutofit/>
+            <a:normAutofit fontScale="40000" lnSpcReduction="20000"/>
           </a:bodyPr>
           <a:lstStyle/>
           <a:p>
-            <a:r>
-              <a:rPr lang="en-US" sz="2400" b="1" dirty="0"/>
-              <a:t>After basic learning student needs to move to places which were centres of excellence – viz.  kAshi </a:t>
-            </a:r>
-          </a:p>
-          <a:p>
-            <a:pPr lvl="1"/>
-            <a:r>
-              <a:rPr lang="en-US" sz="2400" b="1" dirty="0"/>
-              <a:t>Practice of kAshi yAtra comes from this during marriage</a:t>
-            </a:r>
-          </a:p>
-          <a:p>
-            <a:pPr lvl="1"/>
-            <a:r>
-              <a:rPr lang="en-US" sz="2400" b="1" dirty="0"/>
-              <a:t>Brahmacharya, grahasta, vansprasta, sannyaasa</a:t>
-            </a:r>
-          </a:p>
-          <a:p>
-            <a:r>
-              <a:rPr lang="en-US" sz="2400" b="1" dirty="0"/>
-              <a:t>To specific Gurus or Schools/Institutions</a:t>
-            </a:r>
-          </a:p>
-          <a:p>
-            <a:r>
-              <a:rPr lang="en-US" sz="2400" b="1" dirty="0"/>
-              <a:t>Specialisation like Grammar, Chandas, Sastras, PurANAs, Literature was followed</a:t>
-            </a:r>
-          </a:p>
-          <a:p>
-            <a:r>
-              <a:rPr lang="en-US" sz="2400" b="1" dirty="0"/>
-              <a:t>An expert has given that 46 books/subjects must be studied to perfect oneself in Krishna Yajur Veda</a:t>
-            </a:r>
+            <a:endParaRPr lang="en-US" sz="2600" b="1" dirty="0">
+              <a:latin typeface="Arial" panose="020B0604020202020204" pitchFamily="34" charset="0"/>
+              <a:cs typeface="Arial" panose="020B0604020202020204" pitchFamily="34" charset="0"/>
+            </a:endParaRPr>
+          </a:p>
+          <a:p>
+            <a:r>
+              <a:rPr lang="en-US" sz="5100" b="1" dirty="0">
+                <a:cs typeface="Arial" panose="020B0604020202020204" pitchFamily="34" charset="0"/>
+              </a:rPr>
+              <a:t>Minimum Seven to eight years to complete</a:t>
+            </a:r>
+          </a:p>
+          <a:p>
+            <a:pPr lvl="1"/>
+            <a:r>
+              <a:rPr lang="en-US" sz="5100" b="1" dirty="0">
+                <a:cs typeface="Arial" panose="020B0604020202020204" pitchFamily="34" charset="0"/>
+              </a:rPr>
+              <a:t>SamhitA, BrAhmaNam, Aranyam</a:t>
+            </a:r>
+          </a:p>
+          <a:p>
+            <a:pPr lvl="1"/>
+            <a:r>
+              <a:rPr lang="en-US" sz="5100" b="1" dirty="0">
+                <a:cs typeface="Arial" panose="020B0604020202020204" pitchFamily="34" charset="0"/>
+              </a:rPr>
+              <a:t>Pada PAtam and Kramam for SamhitA</a:t>
+            </a:r>
+          </a:p>
+          <a:p>
+            <a:pPr lvl="1"/>
+            <a:r>
+              <a:rPr lang="en-US" sz="5100" b="1" dirty="0">
+                <a:cs typeface="Arial" panose="020B0604020202020204" pitchFamily="34" charset="0"/>
+              </a:rPr>
+              <a:t>Various Sastras, standard karma vidhis and procedures</a:t>
+            </a:r>
+          </a:p>
+          <a:p>
+            <a:pPr lvl="1"/>
+            <a:r>
+              <a:rPr lang="en-US" sz="5100" b="1" dirty="0">
+                <a:cs typeface="Arial" panose="020B0604020202020204" pitchFamily="34" charset="0"/>
+              </a:rPr>
+              <a:t>Various slokas, mantras from </a:t>
+            </a:r>
+            <a:r>
+              <a:rPr lang="en-US" sz="5100" b="1">
+                <a:cs typeface="Arial" panose="020B0604020202020204" pitchFamily="34" charset="0"/>
+              </a:rPr>
+              <a:t>other sources</a:t>
+            </a:r>
+            <a:endParaRPr lang="en-US" sz="5100" b="1" dirty="0">
+              <a:cs typeface="Arial" panose="020B0604020202020204" pitchFamily="34" charset="0"/>
+            </a:endParaRPr>
+          </a:p>
+          <a:p>
+            <a:pPr lvl="1"/>
+            <a:r>
+              <a:rPr lang="en-US" sz="5100" b="1" dirty="0">
+                <a:cs typeface="Arial" panose="020B0604020202020204" pitchFamily="34" charset="0"/>
+              </a:rPr>
+              <a:t>Basic Grammar Rules get covered</a:t>
+            </a:r>
+          </a:p>
+          <a:p>
+            <a:r>
+              <a:rPr lang="en-US" sz="5100" b="1" dirty="0">
+                <a:cs typeface="Arial" panose="020B0604020202020204" pitchFamily="34" charset="0"/>
+              </a:rPr>
+              <a:t>Additional 18-24 months for Jata PAtam</a:t>
+            </a:r>
+          </a:p>
+          <a:p>
+            <a:r>
+              <a:rPr lang="en-US" sz="5100" b="1" dirty="0">
+                <a:cs typeface="Arial" panose="020B0604020202020204" pitchFamily="34" charset="0"/>
+              </a:rPr>
+              <a:t>Additional 18-24 months for Ghana Paatam</a:t>
+            </a:r>
+          </a:p>
+          <a:p>
+            <a:r>
+              <a:rPr lang="en-US" sz="5100" b="1" dirty="0">
+                <a:cs typeface="Arial" panose="020B0604020202020204" pitchFamily="34" charset="0"/>
+              </a:rPr>
+              <a:t>Additional 18-24 months for VarNa Kramam</a:t>
+            </a:r>
+          </a:p>
+          <a:p>
+            <a:pPr lvl="1"/>
+            <a:r>
+              <a:rPr lang="en-US" sz="5100" b="1" dirty="0">
+                <a:cs typeface="Arial" panose="020B0604020202020204" pitchFamily="34" charset="0"/>
+              </a:rPr>
+              <a:t>Combined Study and conceptual learning can shorten overall time depending on time involved, Guru available</a:t>
+            </a:r>
+          </a:p>
+          <a:p>
+            <a:r>
+              <a:rPr lang="en-US" sz="5100" b="1" dirty="0">
+                <a:cs typeface="Arial" panose="020B0604020202020204" pitchFamily="34" charset="0"/>
+              </a:rPr>
+              <a:t>Tough examinations to Pass to get the titles</a:t>
+            </a:r>
+          </a:p>
+          <a:p>
+            <a:endParaRPr lang="en-US" dirty="0"/>
+          </a:p>
+          <a:p>
+            <a:pPr marL="457200" lvl="1" indent="0">
+              <a:buNone/>
+            </a:pPr>
+            <a:r>
+              <a:rPr lang="en-US" dirty="0"/>
+              <a:t>	</a:t>
+            </a:r>
+          </a:p>
+          <a:p>
+            <a:pPr marL="457200" lvl="1" indent="0">
+              <a:buNone/>
+            </a:pPr>
+            <a:endParaRPr lang="en-US" dirty="0"/>
           </a:p>
         </p:txBody>
       </p:sp>
     </p:spTree>
     <p:extLst>
       <p:ext uri="{BB962C8B-B14F-4D97-AF65-F5344CB8AC3E}">
-        <p14:creationId xmlns:p14="http://schemas.microsoft.com/office/powerpoint/2010/main" val="434471426"/>
+        <p14:creationId xmlns:p14="http://schemas.microsoft.com/office/powerpoint/2010/main" val="2285695278"/>
       </p:ext>
     </p:extLst>
   </p:cSld>
@@ -10766,90 +10805,78 @@
         </p:nvSpPr>
         <p:spPr>
           <a:xfrm>
-            <a:off x="534087" y="5377218"/>
-            <a:ext cx="8534400" cy="1094853"/>
+            <a:off x="684212" y="5431809"/>
+            <a:ext cx="8534400" cy="972023"/>
+          </a:xfrm>
+        </p:spPr>
+        <p:txBody>
+          <a:bodyPr/>
+          <a:lstStyle/>
+          <a:p>
+            <a:r>
+              <a:rPr lang="en-US" dirty="0"/>
+              <a:t>Studies and Specialisation</a:t>
+            </a:r>
+          </a:p>
+        </p:txBody>
+      </p:sp>
+      <p:sp>
+        <p:nvSpPr>
+          <p:cNvPr id="3" name="Content Placeholder 2"/>
+          <p:cNvSpPr>
+            <a:spLocks noGrp="1"/>
+          </p:cNvSpPr>
+          <p:nvPr>
+            <p:ph idx="1"/>
+          </p:nvPr>
+        </p:nvSpPr>
+        <p:spPr>
+          <a:xfrm>
+            <a:off x="684212" y="272955"/>
+            <a:ext cx="9729030" cy="5281684"/>
           </a:xfrm>
         </p:spPr>
         <p:txBody>
           <a:bodyPr>
-            <a:normAutofit fontScale="90000"/>
+            <a:normAutofit/>
           </a:bodyPr>
           <a:lstStyle/>
           <a:p>
             <a:r>
-              <a:rPr lang="en-US" dirty="0"/>
-              <a:t>Effects of misuse or Wrong rendition</a:t>
-            </a:r>
-          </a:p>
-        </p:txBody>
-      </p:sp>
-      <p:sp>
-        <p:nvSpPr>
-          <p:cNvPr id="3" name="Content Placeholder 2"/>
-          <p:cNvSpPr>
-            <a:spLocks noGrp="1"/>
-          </p:cNvSpPr>
-          <p:nvPr>
-            <p:ph idx="1"/>
-          </p:nvPr>
-        </p:nvSpPr>
-        <p:spPr>
-          <a:xfrm>
-            <a:off x="684212" y="532893"/>
-            <a:ext cx="8534400" cy="3954439"/>
-          </a:xfrm>
-        </p:spPr>
-        <p:txBody>
-          <a:bodyPr>
-            <a:noAutofit/>
-          </a:bodyPr>
-          <a:lstStyle/>
-          <a:p>
-            <a:r>
-              <a:rPr lang="en-US" sz="2400" b="1" dirty="0">
-                <a:cs typeface="Arial" panose="020B0604020202020204" pitchFamily="34" charset="0"/>
-              </a:rPr>
-              <a:t>Many times you intend saying the opposite</a:t>
-            </a:r>
-          </a:p>
-          <a:p>
-            <a:r>
-              <a:rPr lang="en-US" sz="2400" b="1" dirty="0">
-                <a:cs typeface="Arial" panose="020B0604020202020204" pitchFamily="34" charset="0"/>
-              </a:rPr>
-              <a:t>The body reacts to wrongly intended vibration</a:t>
-            </a:r>
-          </a:p>
-          <a:p>
-            <a:r>
-              <a:rPr lang="en-US" sz="2400" b="1" dirty="0">
-                <a:cs typeface="Arial" panose="020B0604020202020204" pitchFamily="34" charset="0"/>
-              </a:rPr>
-              <a:t>Reflected as physical problems or mental problems</a:t>
-            </a:r>
-          </a:p>
-          <a:p>
-            <a:r>
-              <a:rPr lang="en-US" sz="2400" b="1" dirty="0">
-                <a:cs typeface="Arial" panose="020B0604020202020204" pitchFamily="34" charset="0"/>
-              </a:rPr>
-              <a:t>Right pronunciation, speed and rendering style very critical</a:t>
-            </a:r>
-          </a:p>
-          <a:p>
-            <a:r>
-              <a:rPr lang="en-US" sz="2400" b="1" dirty="0">
-                <a:cs typeface="Arial" panose="020B0604020202020204" pitchFamily="34" charset="0"/>
-              </a:rPr>
-              <a:t>Sage Vyasa warns about consequences of rendering Veda mantras.</a:t>
-            </a:r>
-          </a:p>
-          <a:p>
-            <a:r>
-              <a:rPr lang="en-US" sz="2400" b="1" dirty="0">
-                <a:cs typeface="Arial" panose="020B0604020202020204" pitchFamily="34" charset="0"/>
-              </a:rPr>
-              <a:t>One needs discipline with Food intake and personal habits</a:t>
+              <a:rPr lang="en-US" sz="2400" b="1" dirty="0"/>
+              <a:t>After basic learning student needs to move to places which were centres of excellence – viz.  kAshi </a:t>
+            </a:r>
+          </a:p>
+          <a:p>
+            <a:pPr lvl="1"/>
+            <a:r>
+              <a:rPr lang="en-US" sz="2400" b="1" dirty="0"/>
+              <a:t>Practice of kAshi yAtra comes from this during marriage</a:t>
+            </a:r>
+          </a:p>
+          <a:p>
+            <a:pPr lvl="1"/>
+            <a:r>
+              <a:rPr lang="en-US" sz="2400" b="1" dirty="0"/>
+              <a:t>Brahmacharya, grahasta, vansprasta, sannyaasa</a:t>
+            </a:r>
+          </a:p>
+          <a:p>
+            <a:r>
+              <a:rPr lang="en-US" sz="2400" b="1" dirty="0"/>
+              <a:t>To specific Gurus or Schools/Institutions</a:t>
+            </a:r>
+          </a:p>
+          <a:p>
+            <a:r>
+              <a:rPr lang="en-US" sz="2400" b="1" dirty="0"/>
+              <a:t>Specialisation like Grammar, Chandas, Sastras, PurANAs, Literature was followed</a:t>
+            </a:r>
+          </a:p>
+          <a:p>
+            <a:r>
+              <a:rPr lang="en-US" sz="2400" b="1" dirty="0"/>
+              <a:t>An expert has given that 46 books/subjects must be studied to perfect oneself in Krishna Yajur Veda</a:t>
             </a:r>
           </a:p>
         </p:txBody>
@@ -10857,7 +10884,7 @@
     </p:spTree>
     <p:extLst>
       <p:ext uri="{BB962C8B-B14F-4D97-AF65-F5344CB8AC3E}">
-        <p14:creationId xmlns:p14="http://schemas.microsoft.com/office/powerpoint/2010/main" val="3695913455"/>
+        <p14:creationId xmlns:p14="http://schemas.microsoft.com/office/powerpoint/2010/main" val="434471426"/>
       </p:ext>
     </p:extLst>
   </p:cSld>

</xml_diff>

<commit_message>
Change doc to docx Abhi, TA, TB 07/02/2021
</commit_message>
<xml_diff>
--- a/Veda Lectures/Veda Basics.pptx
+++ b/Veda Lectures/Veda Basics.pptx
@@ -453,7 +453,7 @@
             <a:fld id="{B61BEF0D-F0BB-DE4B-95CE-6DB70DBA9567}" type="datetimeFigureOut">
               <a:rPr lang="en-US" dirty="0"/>
               <a:pPr/>
-              <a:t>2/5/2021</a:t>
+              <a:t>2/7/2021</a:t>
             </a:fld>
             <a:endParaRPr lang="en-US" dirty="0"/>
           </a:p>
@@ -886,7 +886,7 @@
             <a:fld id="{B61BEF0D-F0BB-DE4B-95CE-6DB70DBA9567}" type="datetimeFigureOut">
               <a:rPr lang="en-US" dirty="0"/>
               <a:pPr/>
-              <a:t>2/5/2021</a:t>
+              <a:t>2/7/2021</a:t>
             </a:fld>
             <a:endParaRPr lang="en-US" dirty="0"/>
           </a:p>
@@ -1133,7 +1133,7 @@
             <a:fld id="{B61BEF0D-F0BB-DE4B-95CE-6DB70DBA9567}" type="datetimeFigureOut">
               <a:rPr lang="en-US" dirty="0"/>
               <a:pPr/>
-              <a:t>2/5/2021</a:t>
+              <a:t>2/7/2021</a:t>
             </a:fld>
             <a:endParaRPr lang="en-US" dirty="0"/>
           </a:p>
@@ -1438,7 +1438,7 @@
             <a:fld id="{B61BEF0D-F0BB-DE4B-95CE-6DB70DBA9567}" type="datetimeFigureOut">
               <a:rPr lang="en-US" dirty="0"/>
               <a:pPr/>
-              <a:t>2/5/2021</a:t>
+              <a:t>2/7/2021</a:t>
             </a:fld>
             <a:endParaRPr lang="en-US" dirty="0"/>
           </a:p>
@@ -1753,7 +1753,7 @@
             <a:fld id="{B61BEF0D-F0BB-DE4B-95CE-6DB70DBA9567}" type="datetimeFigureOut">
               <a:rPr lang="en-US" dirty="0"/>
               <a:pPr/>
-              <a:t>2/5/2021</a:t>
+              <a:t>2/7/2021</a:t>
             </a:fld>
             <a:endParaRPr lang="en-US" dirty="0"/>
           </a:p>
@@ -2052,7 +2052,7 @@
             <a:fld id="{B61BEF0D-F0BB-DE4B-95CE-6DB70DBA9567}" type="datetimeFigureOut">
               <a:rPr lang="en-US" dirty="0"/>
               <a:pPr/>
-              <a:t>2/5/2021</a:t>
+              <a:t>2/7/2021</a:t>
             </a:fld>
             <a:endParaRPr lang="en-US" dirty="0"/>
           </a:p>
@@ -2416,7 +2416,7 @@
             <a:fld id="{B61BEF0D-F0BB-DE4B-95CE-6DB70DBA9567}" type="datetimeFigureOut">
               <a:rPr lang="en-US" dirty="0"/>
               <a:pPr/>
-              <a:t>2/5/2021</a:t>
+              <a:t>2/7/2021</a:t>
             </a:fld>
             <a:endParaRPr lang="en-US" dirty="0"/>
           </a:p>
@@ -2587,7 +2587,7 @@
             <a:fld id="{B61BEF0D-F0BB-DE4B-95CE-6DB70DBA9567}" type="datetimeFigureOut">
               <a:rPr lang="en-US" dirty="0"/>
               <a:pPr/>
-              <a:t>2/5/2021</a:t>
+              <a:t>2/7/2021</a:t>
             </a:fld>
             <a:endParaRPr lang="en-US" dirty="0"/>
           </a:p>
@@ -2764,7 +2764,7 @@
             <a:fld id="{B61BEF0D-F0BB-DE4B-95CE-6DB70DBA9567}" type="datetimeFigureOut">
               <a:rPr lang="en-US" dirty="0"/>
               <a:pPr/>
-              <a:t>2/5/2021</a:t>
+              <a:t>2/7/2021</a:t>
             </a:fld>
             <a:endParaRPr lang="en-US" dirty="0"/>
           </a:p>
@@ -2931,7 +2931,7 @@
             <a:fld id="{B61BEF0D-F0BB-DE4B-95CE-6DB70DBA9567}" type="datetimeFigureOut">
               <a:rPr lang="en-US" dirty="0"/>
               <a:pPr/>
-              <a:t>2/5/2021</a:t>
+              <a:t>2/7/2021</a:t>
             </a:fld>
             <a:endParaRPr lang="en-US" dirty="0"/>
           </a:p>
@@ -3178,7 +3178,7 @@
             <a:fld id="{B61BEF0D-F0BB-DE4B-95CE-6DB70DBA9567}" type="datetimeFigureOut">
               <a:rPr lang="en-US" dirty="0"/>
               <a:pPr/>
-              <a:t>2/5/2021</a:t>
+              <a:t>2/7/2021</a:t>
             </a:fld>
             <a:endParaRPr lang="en-US" dirty="0"/>
           </a:p>
@@ -3411,7 +3411,7 @@
             <a:fld id="{B61BEF0D-F0BB-DE4B-95CE-6DB70DBA9567}" type="datetimeFigureOut">
               <a:rPr lang="en-US" dirty="0"/>
               <a:pPr/>
-              <a:t>2/5/2021</a:t>
+              <a:t>2/7/2021</a:t>
             </a:fld>
             <a:endParaRPr lang="en-US" dirty="0"/>
           </a:p>
@@ -3790,7 +3790,7 @@
             <a:fld id="{B61BEF0D-F0BB-DE4B-95CE-6DB70DBA9567}" type="datetimeFigureOut">
               <a:rPr lang="en-US" dirty="0"/>
               <a:pPr/>
-              <a:t>2/5/2021</a:t>
+              <a:t>2/7/2021</a:t>
             </a:fld>
             <a:endParaRPr lang="en-US" dirty="0"/>
           </a:p>
@@ -3905,7 +3905,7 @@
             <a:fld id="{B61BEF0D-F0BB-DE4B-95CE-6DB70DBA9567}" type="datetimeFigureOut">
               <a:rPr lang="en-US" dirty="0"/>
               <a:pPr/>
-              <a:t>2/5/2021</a:t>
+              <a:t>2/7/2021</a:t>
             </a:fld>
             <a:endParaRPr lang="en-US" dirty="0"/>
           </a:p>
@@ -3997,7 +3997,7 @@
             <a:fld id="{B61BEF0D-F0BB-DE4B-95CE-6DB70DBA9567}" type="datetimeFigureOut">
               <a:rPr lang="en-US" dirty="0"/>
               <a:pPr/>
-              <a:t>2/5/2021</a:t>
+              <a:t>2/7/2021</a:t>
             </a:fld>
             <a:endParaRPr lang="en-US" dirty="0"/>
           </a:p>
@@ -4249,7 +4249,7 @@
             <a:fld id="{B61BEF0D-F0BB-DE4B-95CE-6DB70DBA9567}" type="datetimeFigureOut">
               <a:rPr lang="en-US" dirty="0"/>
               <a:pPr/>
-              <a:t>2/5/2021</a:t>
+              <a:t>2/7/2021</a:t>
             </a:fld>
             <a:endParaRPr lang="en-US" dirty="0"/>
           </a:p>
@@ -4529,7 +4529,7 @@
             <a:fld id="{B61BEF0D-F0BB-DE4B-95CE-6DB70DBA9567}" type="datetimeFigureOut">
               <a:rPr lang="en-US" dirty="0"/>
               <a:pPr/>
-              <a:t>2/5/2021</a:t>
+              <a:t>2/7/2021</a:t>
             </a:fld>
             <a:endParaRPr lang="en-US" dirty="0"/>
           </a:p>
@@ -4932,7 +4932,7 @@
             <a:fld id="{B61BEF0D-F0BB-DE4B-95CE-6DB70DBA9567}" type="datetimeFigureOut">
               <a:rPr lang="en-US" dirty="0"/>
               <a:pPr/>
-              <a:t>2/5/2021</a:t>
+              <a:t>2/7/2021</a:t>
             </a:fld>
             <a:endParaRPr lang="en-US" dirty="0"/>
           </a:p>

</xml_diff>

<commit_message>
Word file push 10/02/2021
</commit_message>
<xml_diff>
--- a/Veda Lectures/Veda Basics.pptx
+++ b/Veda Lectures/Veda Basics.pptx
@@ -453,7 +453,7 @@
             <a:fld id="{B61BEF0D-F0BB-DE4B-95CE-6DB70DBA9567}" type="datetimeFigureOut">
               <a:rPr lang="en-US" dirty="0"/>
               <a:pPr/>
-              <a:t>2/7/2021</a:t>
+              <a:t>2/10/2021</a:t>
             </a:fld>
             <a:endParaRPr lang="en-US" dirty="0"/>
           </a:p>
@@ -886,7 +886,7 @@
             <a:fld id="{B61BEF0D-F0BB-DE4B-95CE-6DB70DBA9567}" type="datetimeFigureOut">
               <a:rPr lang="en-US" dirty="0"/>
               <a:pPr/>
-              <a:t>2/7/2021</a:t>
+              <a:t>2/10/2021</a:t>
             </a:fld>
             <a:endParaRPr lang="en-US" dirty="0"/>
           </a:p>
@@ -1133,7 +1133,7 @@
             <a:fld id="{B61BEF0D-F0BB-DE4B-95CE-6DB70DBA9567}" type="datetimeFigureOut">
               <a:rPr lang="en-US" dirty="0"/>
               <a:pPr/>
-              <a:t>2/7/2021</a:t>
+              <a:t>2/10/2021</a:t>
             </a:fld>
             <a:endParaRPr lang="en-US" dirty="0"/>
           </a:p>
@@ -1438,7 +1438,7 @@
             <a:fld id="{B61BEF0D-F0BB-DE4B-95CE-6DB70DBA9567}" type="datetimeFigureOut">
               <a:rPr lang="en-US" dirty="0"/>
               <a:pPr/>
-              <a:t>2/7/2021</a:t>
+              <a:t>2/10/2021</a:t>
             </a:fld>
             <a:endParaRPr lang="en-US" dirty="0"/>
           </a:p>
@@ -1753,7 +1753,7 @@
             <a:fld id="{B61BEF0D-F0BB-DE4B-95CE-6DB70DBA9567}" type="datetimeFigureOut">
               <a:rPr lang="en-US" dirty="0"/>
               <a:pPr/>
-              <a:t>2/7/2021</a:t>
+              <a:t>2/10/2021</a:t>
             </a:fld>
             <a:endParaRPr lang="en-US" dirty="0"/>
           </a:p>
@@ -2052,7 +2052,7 @@
             <a:fld id="{B61BEF0D-F0BB-DE4B-95CE-6DB70DBA9567}" type="datetimeFigureOut">
               <a:rPr lang="en-US" dirty="0"/>
               <a:pPr/>
-              <a:t>2/7/2021</a:t>
+              <a:t>2/10/2021</a:t>
             </a:fld>
             <a:endParaRPr lang="en-US" dirty="0"/>
           </a:p>
@@ -2416,7 +2416,7 @@
             <a:fld id="{B61BEF0D-F0BB-DE4B-95CE-6DB70DBA9567}" type="datetimeFigureOut">
               <a:rPr lang="en-US" dirty="0"/>
               <a:pPr/>
-              <a:t>2/7/2021</a:t>
+              <a:t>2/10/2021</a:t>
             </a:fld>
             <a:endParaRPr lang="en-US" dirty="0"/>
           </a:p>
@@ -2587,7 +2587,7 @@
             <a:fld id="{B61BEF0D-F0BB-DE4B-95CE-6DB70DBA9567}" type="datetimeFigureOut">
               <a:rPr lang="en-US" dirty="0"/>
               <a:pPr/>
-              <a:t>2/7/2021</a:t>
+              <a:t>2/10/2021</a:t>
             </a:fld>
             <a:endParaRPr lang="en-US" dirty="0"/>
           </a:p>
@@ -2764,7 +2764,7 @@
             <a:fld id="{B61BEF0D-F0BB-DE4B-95CE-6DB70DBA9567}" type="datetimeFigureOut">
               <a:rPr lang="en-US" dirty="0"/>
               <a:pPr/>
-              <a:t>2/7/2021</a:t>
+              <a:t>2/10/2021</a:t>
             </a:fld>
             <a:endParaRPr lang="en-US" dirty="0"/>
           </a:p>
@@ -2931,7 +2931,7 @@
             <a:fld id="{B61BEF0D-F0BB-DE4B-95CE-6DB70DBA9567}" type="datetimeFigureOut">
               <a:rPr lang="en-US" dirty="0"/>
               <a:pPr/>
-              <a:t>2/7/2021</a:t>
+              <a:t>2/10/2021</a:t>
             </a:fld>
             <a:endParaRPr lang="en-US" dirty="0"/>
           </a:p>
@@ -3178,7 +3178,7 @@
             <a:fld id="{B61BEF0D-F0BB-DE4B-95CE-6DB70DBA9567}" type="datetimeFigureOut">
               <a:rPr lang="en-US" dirty="0"/>
               <a:pPr/>
-              <a:t>2/7/2021</a:t>
+              <a:t>2/10/2021</a:t>
             </a:fld>
             <a:endParaRPr lang="en-US" dirty="0"/>
           </a:p>
@@ -3411,7 +3411,7 @@
             <a:fld id="{B61BEF0D-F0BB-DE4B-95CE-6DB70DBA9567}" type="datetimeFigureOut">
               <a:rPr lang="en-US" dirty="0"/>
               <a:pPr/>
-              <a:t>2/7/2021</a:t>
+              <a:t>2/10/2021</a:t>
             </a:fld>
             <a:endParaRPr lang="en-US" dirty="0"/>
           </a:p>
@@ -3790,7 +3790,7 @@
             <a:fld id="{B61BEF0D-F0BB-DE4B-95CE-6DB70DBA9567}" type="datetimeFigureOut">
               <a:rPr lang="en-US" dirty="0"/>
               <a:pPr/>
-              <a:t>2/7/2021</a:t>
+              <a:t>2/10/2021</a:t>
             </a:fld>
             <a:endParaRPr lang="en-US" dirty="0"/>
           </a:p>
@@ -3905,7 +3905,7 @@
             <a:fld id="{B61BEF0D-F0BB-DE4B-95CE-6DB70DBA9567}" type="datetimeFigureOut">
               <a:rPr lang="en-US" dirty="0"/>
               <a:pPr/>
-              <a:t>2/7/2021</a:t>
+              <a:t>2/10/2021</a:t>
             </a:fld>
             <a:endParaRPr lang="en-US" dirty="0"/>
           </a:p>
@@ -3997,7 +3997,7 @@
             <a:fld id="{B61BEF0D-F0BB-DE4B-95CE-6DB70DBA9567}" type="datetimeFigureOut">
               <a:rPr lang="en-US" dirty="0"/>
               <a:pPr/>
-              <a:t>2/7/2021</a:t>
+              <a:t>2/10/2021</a:t>
             </a:fld>
             <a:endParaRPr lang="en-US" dirty="0"/>
           </a:p>
@@ -4249,7 +4249,7 @@
             <a:fld id="{B61BEF0D-F0BB-DE4B-95CE-6DB70DBA9567}" type="datetimeFigureOut">
               <a:rPr lang="en-US" dirty="0"/>
               <a:pPr/>
-              <a:t>2/7/2021</a:t>
+              <a:t>2/10/2021</a:t>
             </a:fld>
             <a:endParaRPr lang="en-US" dirty="0"/>
           </a:p>
@@ -4529,7 +4529,7 @@
             <a:fld id="{B61BEF0D-F0BB-DE4B-95CE-6DB70DBA9567}" type="datetimeFigureOut">
               <a:rPr lang="en-US" dirty="0"/>
               <a:pPr/>
-              <a:t>2/7/2021</a:t>
+              <a:t>2/10/2021</a:t>
             </a:fld>
             <a:endParaRPr lang="en-US" dirty="0"/>
           </a:p>
@@ -4932,7 +4932,7 @@
             <a:fld id="{B61BEF0D-F0BB-DE4B-95CE-6DB70DBA9567}" type="datetimeFigureOut">
               <a:rPr lang="en-US" dirty="0"/>
               <a:pPr/>
-              <a:t>2/7/2021</a:t>
+              <a:t>2/10/2021</a:t>
             </a:fld>
             <a:endParaRPr lang="en-US" dirty="0"/>
           </a:p>

</xml_diff>